<commit_message>
Add solution Welcome Page
</commit_message>
<xml_diff>
--- a/Lecture_notes_ppts/POLS0008-2022-23 Week 3 Examining Data II.pptx
+++ b/Lecture_notes_ppts/POLS0008-2022-23 Week 3 Examining Data II.pptx
@@ -6,7 +6,7 @@
     <p:sldMasterId id="2147483660" r:id="rId2"/>
   </p:sldMasterIdLst>
   <p:notesMasterIdLst>
-    <p:notesMasterId r:id="rId42"/>
+    <p:notesMasterId r:id="rId44"/>
   </p:notesMasterIdLst>
   <p:sldIdLst>
     <p:sldId id="420" r:id="rId3"/>
@@ -47,7 +47,9 @@
     <p:sldId id="1362" r:id="rId38"/>
     <p:sldId id="1363" r:id="rId39"/>
     <p:sldId id="1364" r:id="rId40"/>
-    <p:sldId id="1301" r:id="rId41"/>
+    <p:sldId id="1365" r:id="rId41"/>
+    <p:sldId id="1366" r:id="rId42"/>
+    <p:sldId id="1301" r:id="rId43"/>
   </p:sldIdLst>
   <p:sldSz cx="12192000" cy="6858000"/>
   <p:notesSz cx="6858000" cy="9144000"/>
@@ -262,7 +264,7 @@
           <a:p>
             <a:fld id="{B189E245-271D-FD48-BFBB-D05CACE4EE11}" type="datetimeFigureOut">
               <a:rPr lang="en-US" smtClean="0"/>
-              <a:t>1/22/23</a:t>
+              <a:t>1/22/24</a:t>
             </a:fld>
             <a:endParaRPr lang="en-US"/>
           </a:p>
@@ -1487,6 +1489,91 @@
 </p:notes>
 </file>
 
+<file path=ppt/notesSlides/notesSlide19.xml><?xml version="1.0" encoding="utf-8"?>
+<p:notes xmlns:a="http://schemas.openxmlformats.org/drawingml/2006/main" xmlns:r="http://schemas.openxmlformats.org/officeDocument/2006/relationships" xmlns:p="http://schemas.openxmlformats.org/presentationml/2006/main">
+  <p:cSld>
+    <p:spTree>
+      <p:nvGrpSpPr>
+        <p:cNvPr id="1" name=""/>
+        <p:cNvGrpSpPr/>
+        <p:nvPr/>
+      </p:nvGrpSpPr>
+      <p:grpSpPr>
+        <a:xfrm>
+          <a:off x="0" y="0"/>
+          <a:ext cx="0" cy="0"/>
+          <a:chOff x="0" y="0"/>
+          <a:chExt cx="0" cy="0"/>
+        </a:xfrm>
+      </p:grpSpPr>
+      <p:sp>
+        <p:nvSpPr>
+          <p:cNvPr id="2" name="Slide Image Placeholder 1"/>
+          <p:cNvSpPr>
+            <a:spLocks noGrp="1" noRot="1" noChangeAspect="1"/>
+          </p:cNvSpPr>
+          <p:nvPr>
+            <p:ph type="sldImg"/>
+          </p:nvPr>
+        </p:nvSpPr>
+        <p:spPr/>
+      </p:sp>
+      <p:sp>
+        <p:nvSpPr>
+          <p:cNvPr id="3" name="Notes Placeholder 2"/>
+          <p:cNvSpPr>
+            <a:spLocks noGrp="1"/>
+          </p:cNvSpPr>
+          <p:nvPr>
+            <p:ph type="body" idx="1"/>
+          </p:nvPr>
+        </p:nvSpPr>
+        <p:spPr/>
+        <p:txBody>
+          <a:bodyPr/>
+          <a:lstStyle/>
+          <a:p>
+            <a:endParaRPr lang="en-US" dirty="0"/>
+          </a:p>
+        </p:txBody>
+      </p:sp>
+      <p:sp>
+        <p:nvSpPr>
+          <p:cNvPr id="4" name="Slide Number Placeholder 3"/>
+          <p:cNvSpPr>
+            <a:spLocks noGrp="1"/>
+          </p:cNvSpPr>
+          <p:nvPr>
+            <p:ph type="sldNum" sz="quarter" idx="5"/>
+          </p:nvPr>
+        </p:nvSpPr>
+        <p:spPr/>
+        <p:txBody>
+          <a:bodyPr/>
+          <a:lstStyle/>
+          <a:p>
+            <a:fld id="{BC973DE8-1EC7-9C41-B6BA-DB20899CA618}" type="slidenum">
+              <a:rPr lang="en-US" altLang="x-none" smtClean="0"/>
+              <a:pPr/>
+              <a:t>39</a:t>
+            </a:fld>
+            <a:endParaRPr lang="en-US" altLang="x-none"/>
+          </a:p>
+        </p:txBody>
+      </p:sp>
+    </p:spTree>
+    <p:extLst>
+      <p:ext uri="{BB962C8B-B14F-4D97-AF65-F5344CB8AC3E}">
+        <p14:creationId xmlns:p14="http://schemas.microsoft.com/office/powerpoint/2010/main" val="3318061009"/>
+      </p:ext>
+    </p:extLst>
+  </p:cSld>
+  <p:clrMapOvr>
+    <a:masterClrMapping/>
+  </p:clrMapOvr>
+</p:notes>
+</file>
+
 <file path=ppt/notesSlides/notesSlide2.xml><?xml version="1.0" encoding="utf-8"?>
 <p:notes xmlns:a="http://schemas.openxmlformats.org/drawingml/2006/main" xmlns:r="http://schemas.openxmlformats.org/officeDocument/2006/relationships" xmlns:p="http://schemas.openxmlformats.org/presentationml/2006/main">
   <p:cSld>
@@ -2425,7 +2512,7 @@
           <a:p>
             <a:fld id="{2BB000D9-F882-5444-9F67-E68F2BDFFFE1}" type="datetimeFigureOut">
               <a:rPr lang="en-US" smtClean="0"/>
-              <a:t>1/22/23</a:t>
+              <a:t>1/22/24</a:t>
             </a:fld>
             <a:endParaRPr lang="en-US"/>
           </a:p>
@@ -2633,7 +2720,7 @@
           <a:p>
             <a:fld id="{2BB000D9-F882-5444-9F67-E68F2BDFFFE1}" type="datetimeFigureOut">
               <a:rPr lang="en-US" smtClean="0"/>
-              <a:t>1/22/23</a:t>
+              <a:t>1/22/24</a:t>
             </a:fld>
             <a:endParaRPr lang="en-US"/>
           </a:p>
@@ -3018,7 +3105,7 @@
           <a:p>
             <a:fld id="{C21145F5-A5E9-5F43-82CD-3B9BA6E3131E}" type="datetimeFigureOut">
               <a:rPr lang="en-US" smtClean="0"/>
-              <a:t>1/22/23</a:t>
+              <a:t>1/22/24</a:t>
             </a:fld>
             <a:endParaRPr lang="en-US"/>
           </a:p>
@@ -3226,7 +3313,7 @@
           <a:p>
             <a:fld id="{C21145F5-A5E9-5F43-82CD-3B9BA6E3131E}" type="datetimeFigureOut">
               <a:rPr lang="en-US" smtClean="0"/>
-              <a:t>1/22/23</a:t>
+              <a:t>1/22/24</a:t>
             </a:fld>
             <a:endParaRPr lang="en-US"/>
           </a:p>
@@ -3501,7 +3588,7 @@
           <a:p>
             <a:fld id="{C21145F5-A5E9-5F43-82CD-3B9BA6E3131E}" type="datetimeFigureOut">
               <a:rPr lang="en-US" smtClean="0"/>
-              <a:t>1/22/23</a:t>
+              <a:t>1/22/24</a:t>
             </a:fld>
             <a:endParaRPr lang="en-US"/>
           </a:p>
@@ -3768,7 +3855,7 @@
           <a:p>
             <a:fld id="{C21145F5-A5E9-5F43-82CD-3B9BA6E3131E}" type="datetimeFigureOut">
               <a:rPr lang="en-US" smtClean="0"/>
-              <a:t>1/22/23</a:t>
+              <a:t>1/22/24</a:t>
             </a:fld>
             <a:endParaRPr lang="en-US"/>
           </a:p>
@@ -4171,7 +4258,7 @@
           <a:p>
             <a:fld id="{C21145F5-A5E9-5F43-82CD-3B9BA6E3131E}" type="datetimeFigureOut">
               <a:rPr lang="en-US" smtClean="0"/>
-              <a:t>1/22/23</a:t>
+              <a:t>1/22/24</a:t>
             </a:fld>
             <a:endParaRPr lang="en-US"/>
           </a:p>
@@ -4320,7 +4407,7 @@
           <a:p>
             <a:fld id="{C21145F5-A5E9-5F43-82CD-3B9BA6E3131E}" type="datetimeFigureOut">
               <a:rPr lang="en-US" smtClean="0"/>
-              <a:t>1/22/23</a:t>
+              <a:t>1/22/24</a:t>
             </a:fld>
             <a:endParaRPr lang="en-US"/>
           </a:p>
@@ -4469,7 +4556,7 @@
           <a:p>
             <a:fld id="{C21145F5-A5E9-5F43-82CD-3B9BA6E3131E}" type="datetimeFigureOut">
               <a:rPr lang="en-US" smtClean="0"/>
-              <a:t>1/22/23</a:t>
+              <a:t>1/22/24</a:t>
             </a:fld>
             <a:endParaRPr lang="en-US"/>
           </a:p>
@@ -4777,7 +4864,7 @@
           <a:p>
             <a:fld id="{C21145F5-A5E9-5F43-82CD-3B9BA6E3131E}" type="datetimeFigureOut">
               <a:rPr lang="en-US" smtClean="0"/>
-              <a:t>1/22/23</a:t>
+              <a:t>1/22/24</a:t>
             </a:fld>
             <a:endParaRPr lang="en-US"/>
           </a:p>
@@ -5062,7 +5149,7 @@
           <a:p>
             <a:fld id="{C21145F5-A5E9-5F43-82CD-3B9BA6E3131E}" type="datetimeFigureOut">
               <a:rPr lang="en-US" smtClean="0"/>
-              <a:t>1/22/23</a:t>
+              <a:t>1/22/24</a:t>
             </a:fld>
             <a:endParaRPr lang="en-US"/>
           </a:p>
@@ -5270,7 +5357,7 @@
           <a:p>
             <a:fld id="{C21145F5-A5E9-5F43-82CD-3B9BA6E3131E}" type="datetimeFigureOut">
               <a:rPr lang="en-US" smtClean="0"/>
-              <a:t>1/22/23</a:t>
+              <a:t>1/22/24</a:t>
             </a:fld>
             <a:endParaRPr lang="en-US"/>
           </a:p>
@@ -5478,7 +5565,7 @@
           <a:p>
             <a:fld id="{C21145F5-A5E9-5F43-82CD-3B9BA6E3131E}" type="datetimeFigureOut">
               <a:rPr lang="en-US" smtClean="0"/>
-              <a:t>1/22/23</a:t>
+              <a:t>1/22/24</a:t>
             </a:fld>
             <a:endParaRPr lang="en-US"/>
           </a:p>
@@ -5753,7 +5840,7 @@
           <a:p>
             <a:fld id="{2BB000D9-F882-5444-9F67-E68F2BDFFFE1}" type="datetimeFigureOut">
               <a:rPr lang="en-US" smtClean="0"/>
-              <a:t>1/22/23</a:t>
+              <a:t>1/22/24</a:t>
             </a:fld>
             <a:endParaRPr lang="en-US"/>
           </a:p>
@@ -6020,7 +6107,7 @@
           <a:p>
             <a:fld id="{2BB000D9-F882-5444-9F67-E68F2BDFFFE1}" type="datetimeFigureOut">
               <a:rPr lang="en-US" smtClean="0"/>
-              <a:t>1/22/23</a:t>
+              <a:t>1/22/24</a:t>
             </a:fld>
             <a:endParaRPr lang="en-US"/>
           </a:p>
@@ -6423,7 +6510,7 @@
           <a:p>
             <a:fld id="{2BB000D9-F882-5444-9F67-E68F2BDFFFE1}" type="datetimeFigureOut">
               <a:rPr lang="en-US" smtClean="0"/>
-              <a:t>1/22/23</a:t>
+              <a:t>1/22/24</a:t>
             </a:fld>
             <a:endParaRPr lang="en-US"/>
           </a:p>
@@ -6572,7 +6659,7 @@
           <a:p>
             <a:fld id="{2BB000D9-F882-5444-9F67-E68F2BDFFFE1}" type="datetimeFigureOut">
               <a:rPr lang="en-US" smtClean="0"/>
-              <a:t>1/22/23</a:t>
+              <a:t>1/22/24</a:t>
             </a:fld>
             <a:endParaRPr lang="en-US"/>
           </a:p>
@@ -6691,7 +6778,7 @@
           <a:p>
             <a:fld id="{2BB000D9-F882-5444-9F67-E68F2BDFFFE1}" type="datetimeFigureOut">
               <a:rPr lang="en-US" smtClean="0"/>
-              <a:t>1/22/23</a:t>
+              <a:t>1/22/24</a:t>
             </a:fld>
             <a:endParaRPr lang="en-US"/>
           </a:p>
@@ -6999,7 +7086,7 @@
           <a:p>
             <a:fld id="{2BB000D9-F882-5444-9F67-E68F2BDFFFE1}" type="datetimeFigureOut">
               <a:rPr lang="en-US" smtClean="0"/>
-              <a:t>1/22/23</a:t>
+              <a:t>1/22/24</a:t>
             </a:fld>
             <a:endParaRPr lang="en-US"/>
           </a:p>
@@ -7284,7 +7371,7 @@
           <a:p>
             <a:fld id="{2BB000D9-F882-5444-9F67-E68F2BDFFFE1}" type="datetimeFigureOut">
               <a:rPr lang="en-US" smtClean="0"/>
-              <a:t>1/22/23</a:t>
+              <a:t>1/22/24</a:t>
             </a:fld>
             <a:endParaRPr lang="en-US"/>
           </a:p>
@@ -7518,7 +7605,7 @@
           <a:p>
             <a:r>
               <a:rPr lang="en-US" sz="1000" dirty="0"/>
-              <a:t>22/01/2023</a:t>
+              <a:t>22/01/2024</a:t>
             </a:r>
             <a:endParaRPr lang="en-GB" sz="1000" dirty="0"/>
           </a:p>
@@ -9254,8 +9341,8 @@
         </p:nvSpPr>
         <p:spPr>
           <a:xfrm>
-            <a:off x="838200" y="-279074"/>
-            <a:ext cx="10515600" cy="1325563"/>
+            <a:off x="838200" y="225468"/>
+            <a:ext cx="10515600" cy="663223"/>
           </a:xfrm>
         </p:spPr>
         <p:txBody>
@@ -9264,13 +9351,13 @@
           <a:p>
             <a:pPr algn="ctr"/>
             <a:r>
-              <a:rPr lang="en-GB" b="1" dirty="0">
+              <a:rPr lang="en-GB" sz="3600" b="1" dirty="0">
                 <a:latin typeface="Helvetica Neue Thin" panose="020B0403020202020204" pitchFamily="34" charset="0"/>
                 <a:ea typeface="Helvetica Neue Thin" panose="020B0403020202020204" pitchFamily="34" charset="0"/>
               </a:rPr>
               <a:t>General techniques for data visualisation [2]</a:t>
             </a:r>
-            <a:endParaRPr lang="en-GB" b="1" dirty="0">
+            <a:endParaRPr lang="en-GB" sz="3600" b="1" dirty="0">
               <a:latin typeface="HELVETICA NEUE THIN" panose="020B0403020202020204" pitchFamily="34" charset="0"/>
               <a:ea typeface="HELVETICA NEUE THIN" panose="020B0403020202020204" pitchFamily="34" charset="0"/>
             </a:endParaRPr>
@@ -9295,7 +9382,7 @@
         </p:nvSpPr>
         <p:spPr>
           <a:xfrm>
-            <a:off x="1038922" y="667348"/>
+            <a:off x="1030348" y="971039"/>
             <a:ext cx="10515600" cy="4351338"/>
           </a:xfrm>
         </p:spPr>
@@ -9340,8 +9427,8 @@
         </p:blipFill>
         <p:spPr>
           <a:xfrm>
-            <a:off x="1078880" y="1165658"/>
-            <a:ext cx="10034239" cy="5381891"/>
+            <a:off x="1078880" y="1535623"/>
+            <a:ext cx="9154884" cy="4910247"/>
           </a:xfrm>
           <a:prstGeom prst="rect">
             <a:avLst/>
@@ -9425,14 +9512,14 @@
           </a:prstGeom>
           <a:extLst>
             <a:ext uri="{909E8E84-426E-40dd-AFC4-6F175D3DCCD1}">
-              <a14:hiddenFill xmlns:a14="http://schemas.microsoft.com/office/drawing/2010/main" xmlns="">
+              <a14:hiddenFill xmlns="" xmlns:a14="http://schemas.microsoft.com/office/drawing/2010/main">
                 <a:solidFill>
                   <a:srgbClr val="FFFFFF"/>
                 </a:solidFill>
               </a14:hiddenFill>
             </a:ext>
             <a:ext uri="{91240B29-F687-4f45-9708-019B960494DF}">
-              <a14:hiddenLine xmlns:a14="http://schemas.microsoft.com/office/drawing/2010/main" xmlns="" w="9525">
+              <a14:hiddenLine xmlns="" xmlns:a14="http://schemas.microsoft.com/office/drawing/2010/main" w="9525">
                 <a:solidFill>
                   <a:srgbClr val="000000"/>
                 </a:solidFill>
@@ -9633,8 +9720,8 @@
         </p:nvSpPr>
         <p:spPr>
           <a:xfrm>
-            <a:off x="838200" y="-334830"/>
-            <a:ext cx="10515600" cy="1325563"/>
+            <a:off x="838200" y="142067"/>
+            <a:ext cx="10515600" cy="632363"/>
           </a:xfrm>
         </p:spPr>
         <p:txBody>
@@ -9643,13 +9730,13 @@
           <a:p>
             <a:pPr algn="ctr"/>
             <a:r>
-              <a:rPr lang="en-GB" b="1" dirty="0">
+              <a:rPr lang="en-GB" sz="3600" b="1" dirty="0">
                 <a:latin typeface="Helvetica Neue Thin" panose="020B0403020202020204" pitchFamily="34" charset="0"/>
                 <a:ea typeface="Helvetica Neue Thin" panose="020B0403020202020204" pitchFamily="34" charset="0"/>
               </a:rPr>
               <a:t>General techniques for data visualisation [3]</a:t>
             </a:r>
-            <a:endParaRPr lang="en-GB" b="1" dirty="0">
+            <a:endParaRPr lang="en-GB" sz="3600" b="1" dirty="0">
               <a:latin typeface="HELVETICA NEUE THIN" panose="020B0403020202020204" pitchFamily="34" charset="0"/>
               <a:ea typeface="HELVETICA NEUE THIN" panose="020B0403020202020204" pitchFamily="34" charset="0"/>
             </a:endParaRPr>
@@ -9674,7 +9761,7 @@
         </p:nvSpPr>
         <p:spPr>
           <a:xfrm>
-            <a:off x="1005469" y="611591"/>
+            <a:off x="1030348" y="774430"/>
             <a:ext cx="10515600" cy="4351338"/>
           </a:xfrm>
         </p:spPr>
@@ -9719,7 +9806,7 @@
         </p:blipFill>
         <p:spPr>
           <a:xfrm>
-            <a:off x="1473820" y="1069880"/>
+            <a:off x="1461293" y="1170088"/>
             <a:ext cx="8807604" cy="5545845"/>
           </a:xfrm>
           <a:prstGeom prst="rect">
@@ -9751,14 +9838,14 @@
           </a:prstGeom>
           <a:extLst>
             <a:ext uri="{909E8E84-426E-40dd-AFC4-6F175D3DCCD1}">
-              <a14:hiddenFill xmlns:a14="http://schemas.microsoft.com/office/drawing/2010/main" xmlns="">
+              <a14:hiddenFill xmlns="" xmlns:a14="http://schemas.microsoft.com/office/drawing/2010/main">
                 <a:solidFill>
                   <a:srgbClr val="FFFFFF"/>
                 </a:solidFill>
               </a14:hiddenFill>
             </a:ext>
             <a:ext uri="{91240B29-F687-4f45-9708-019B960494DF}">
-              <a14:hiddenLine xmlns:a14="http://schemas.microsoft.com/office/drawing/2010/main" xmlns="" w="9525">
+              <a14:hiddenLine xmlns="" xmlns:a14="http://schemas.microsoft.com/office/drawing/2010/main" w="9525">
                 <a:solidFill>
                   <a:srgbClr val="000000"/>
                 </a:solidFill>
@@ -9959,8 +10046,8 @@
         </p:nvSpPr>
         <p:spPr>
           <a:xfrm>
-            <a:off x="862361" y="-345687"/>
-            <a:ext cx="10515600" cy="1325563"/>
+            <a:off x="862361" y="289082"/>
+            <a:ext cx="10515600" cy="690794"/>
           </a:xfrm>
         </p:spPr>
         <p:txBody>
@@ -9969,13 +10056,13 @@
           <a:p>
             <a:pPr algn="ctr"/>
             <a:r>
-              <a:rPr lang="en-GB" b="1" dirty="0">
+              <a:rPr lang="en-GB" sz="3600" b="1" dirty="0">
                 <a:latin typeface="Helvetica Neue Thin" panose="020B0403020202020204" pitchFamily="34" charset="0"/>
                 <a:ea typeface="Helvetica Neue Thin" panose="020B0403020202020204" pitchFamily="34" charset="0"/>
               </a:rPr>
               <a:t>General techniques for data visualisation [4]</a:t>
             </a:r>
-            <a:endParaRPr lang="en-GB" b="1" dirty="0">
+            <a:endParaRPr lang="en-GB" sz="3600" b="1" dirty="0">
               <a:latin typeface="HELVETICA NEUE THIN" panose="020B0403020202020204" pitchFamily="34" charset="0"/>
               <a:ea typeface="HELVETICA NEUE THIN" panose="020B0403020202020204" pitchFamily="34" charset="0"/>
             </a:endParaRPr>
@@ -10000,7 +10087,7 @@
         </p:nvSpPr>
         <p:spPr>
           <a:xfrm>
-            <a:off x="1050073" y="622742"/>
+            <a:off x="1030348" y="979876"/>
             <a:ext cx="10515600" cy="4351338"/>
           </a:xfrm>
         </p:spPr>
@@ -10046,8 +10133,8 @@
         </p:blipFill>
         <p:spPr>
           <a:xfrm>
-            <a:off x="1594625" y="1096600"/>
-            <a:ext cx="8396868" cy="5472318"/>
+            <a:off x="2054267" y="1396154"/>
+            <a:ext cx="7937225" cy="5172764"/>
           </a:xfrm>
           <a:prstGeom prst="rect">
             <a:avLst/>
@@ -10068,7 +10155,7 @@
         </p:nvSpPr>
         <p:spPr>
           <a:xfrm>
-            <a:off x="8341112" y="727268"/>
+            <a:off x="9083700" y="1044730"/>
             <a:ext cx="1550020" cy="369332"/>
           </a:xfrm>
           <a:prstGeom prst="rect">
@@ -10128,14 +10215,14 @@
           </a:prstGeom>
           <a:extLst>
             <a:ext uri="{909E8E84-426E-40dd-AFC4-6F175D3DCCD1}">
-              <a14:hiddenFill xmlns:a14="http://schemas.microsoft.com/office/drawing/2010/main" xmlns="">
+              <a14:hiddenFill xmlns="" xmlns:a14="http://schemas.microsoft.com/office/drawing/2010/main">
                 <a:solidFill>
                   <a:srgbClr val="FFFFFF"/>
                 </a:solidFill>
               </a14:hiddenFill>
             </a:ext>
             <a:ext uri="{91240B29-F687-4f45-9708-019B960494DF}">
-              <a14:hiddenLine xmlns:a14="http://schemas.microsoft.com/office/drawing/2010/main" xmlns="" w="9525">
+              <a14:hiddenLine xmlns="" xmlns:a14="http://schemas.microsoft.com/office/drawing/2010/main" w="9525">
                 <a:solidFill>
                   <a:srgbClr val="000000"/>
                 </a:solidFill>
@@ -10750,14 +10837,14 @@
           </a:prstGeom>
           <a:extLst>
             <a:ext uri="{909E8E84-426E-40dd-AFC4-6F175D3DCCD1}">
-              <a14:hiddenFill xmlns:a14="http://schemas.microsoft.com/office/drawing/2010/main" xmlns="">
+              <a14:hiddenFill xmlns="" xmlns:a14="http://schemas.microsoft.com/office/drawing/2010/main">
                 <a:solidFill>
                   <a:srgbClr val="FFFFFF"/>
                 </a:solidFill>
               </a14:hiddenFill>
             </a:ext>
             <a:ext uri="{91240B29-F687-4f45-9708-019B960494DF}">
-              <a14:hiddenLine xmlns:a14="http://schemas.microsoft.com/office/drawing/2010/main" xmlns="" w="9525">
+              <a14:hiddenLine xmlns="" xmlns:a14="http://schemas.microsoft.com/office/drawing/2010/main" w="9525">
                 <a:solidFill>
                   <a:srgbClr val="000000"/>
                 </a:solidFill>
@@ -11435,14 +11522,14 @@
           </a:prstGeom>
           <a:extLst>
             <a:ext uri="{909E8E84-426E-40dd-AFC4-6F175D3DCCD1}">
-              <a14:hiddenFill xmlns:a14="http://schemas.microsoft.com/office/drawing/2010/main" xmlns="">
+              <a14:hiddenFill xmlns="" xmlns:a14="http://schemas.microsoft.com/office/drawing/2010/main">
                 <a:solidFill>
                   <a:srgbClr val="FFFFFF"/>
                 </a:solidFill>
               </a14:hiddenFill>
             </a:ext>
             <a:ext uri="{91240B29-F687-4f45-9708-019B960494DF}">
-              <a14:hiddenLine xmlns:a14="http://schemas.microsoft.com/office/drawing/2010/main" xmlns="" w="9525">
+              <a14:hiddenLine xmlns="" xmlns:a14="http://schemas.microsoft.com/office/drawing/2010/main" w="9525">
                 <a:solidFill>
                   <a:srgbClr val="000000"/>
                 </a:solidFill>
@@ -12086,14 +12173,14 @@
           </a:prstGeom>
           <a:extLst>
             <a:ext uri="{909E8E84-426E-40dd-AFC4-6F175D3DCCD1}">
-              <a14:hiddenFill xmlns:a14="http://schemas.microsoft.com/office/drawing/2010/main" xmlns="">
+              <a14:hiddenFill xmlns="" xmlns:a14="http://schemas.microsoft.com/office/drawing/2010/main">
                 <a:solidFill>
                   <a:srgbClr val="FFFFFF"/>
                 </a:solidFill>
               </a14:hiddenFill>
             </a:ext>
             <a:ext uri="{91240B29-F687-4f45-9708-019B960494DF}">
-              <a14:hiddenLine xmlns:a14="http://schemas.microsoft.com/office/drawing/2010/main" xmlns="" w="9525">
+              <a14:hiddenLine xmlns="" xmlns:a14="http://schemas.microsoft.com/office/drawing/2010/main" w="9525">
                 <a:solidFill>
                   <a:srgbClr val="000000"/>
                 </a:solidFill>
@@ -12885,14 +12972,14 @@
           </a:prstGeom>
           <a:extLst>
             <a:ext uri="{909E8E84-426E-40dd-AFC4-6F175D3DCCD1}">
-              <a14:hiddenFill xmlns:a14="http://schemas.microsoft.com/office/drawing/2010/main" xmlns="">
+              <a14:hiddenFill xmlns="" xmlns:a14="http://schemas.microsoft.com/office/drawing/2010/main">
                 <a:solidFill>
                   <a:srgbClr val="FFFFFF"/>
                 </a:solidFill>
               </a14:hiddenFill>
             </a:ext>
             <a:ext uri="{91240B29-F687-4f45-9708-019B960494DF}">
-              <a14:hiddenLine xmlns:a14="http://schemas.microsoft.com/office/drawing/2010/main" xmlns="" w="9525">
+              <a14:hiddenLine xmlns="" xmlns:a14="http://schemas.microsoft.com/office/drawing/2010/main" w="9525">
                 <a:solidFill>
                   <a:srgbClr val="000000"/>
                 </a:solidFill>
@@ -13546,14 +13633,14 @@
           </a:prstGeom>
           <a:extLst>
             <a:ext uri="{909E8E84-426E-40dd-AFC4-6F175D3DCCD1}">
-              <a14:hiddenFill xmlns:a14="http://schemas.microsoft.com/office/drawing/2010/main" xmlns="">
+              <a14:hiddenFill xmlns="" xmlns:a14="http://schemas.microsoft.com/office/drawing/2010/main">
                 <a:solidFill>
                   <a:srgbClr val="FFFFFF"/>
                 </a:solidFill>
               </a14:hiddenFill>
             </a:ext>
             <a:ext uri="{91240B29-F687-4f45-9708-019B960494DF}">
-              <a14:hiddenLine xmlns:a14="http://schemas.microsoft.com/office/drawing/2010/main" xmlns="" w="9525">
+              <a14:hiddenLine xmlns="" xmlns:a14="http://schemas.microsoft.com/office/drawing/2010/main" w="9525">
                 <a:solidFill>
                   <a:srgbClr val="000000"/>
                 </a:solidFill>
@@ -14350,14 +14437,14 @@
           </a:prstGeom>
           <a:extLst>
             <a:ext uri="{909E8E84-426E-40dd-AFC4-6F175D3DCCD1}">
-              <a14:hiddenFill xmlns:a14="http://schemas.microsoft.com/office/drawing/2010/main" xmlns="">
+              <a14:hiddenFill xmlns="" xmlns:a14="http://schemas.microsoft.com/office/drawing/2010/main">
                 <a:solidFill>
                   <a:srgbClr val="FFFFFF"/>
                 </a:solidFill>
               </a14:hiddenFill>
             </a:ext>
             <a:ext uri="{91240B29-F687-4f45-9708-019B960494DF}">
-              <a14:hiddenLine xmlns:a14="http://schemas.microsoft.com/office/drawing/2010/main" xmlns="" w="9525">
+              <a14:hiddenLine xmlns="" xmlns:a14="http://schemas.microsoft.com/office/drawing/2010/main" w="9525">
                 <a:solidFill>
                   <a:srgbClr val="000000"/>
                 </a:solidFill>
@@ -14756,14 +14843,14 @@
           </a:prstGeom>
           <a:extLst>
             <a:ext uri="{909E8E84-426E-40dd-AFC4-6F175D3DCCD1}">
-              <a14:hiddenFill xmlns:a14="http://schemas.microsoft.com/office/drawing/2010/main" xmlns="">
+              <a14:hiddenFill xmlns="" xmlns:a14="http://schemas.microsoft.com/office/drawing/2010/main">
                 <a:solidFill>
                   <a:srgbClr val="FFFFFF"/>
                 </a:solidFill>
               </a14:hiddenFill>
             </a:ext>
             <a:ext uri="{91240B29-F687-4f45-9708-019B960494DF}">
-              <a14:hiddenLine xmlns:a14="http://schemas.microsoft.com/office/drawing/2010/main" xmlns="" w="9525">
+              <a14:hiddenLine xmlns="" xmlns:a14="http://schemas.microsoft.com/office/drawing/2010/main" w="9525">
                 <a:solidFill>
                   <a:srgbClr val="000000"/>
                 </a:solidFill>
@@ -15075,14 +15162,14 @@
           </a:prstGeom>
           <a:extLst>
             <a:ext uri="{909E8E84-426E-40dd-AFC4-6F175D3DCCD1}">
-              <a14:hiddenFill xmlns:a14="http://schemas.microsoft.com/office/drawing/2010/main" xmlns="">
+              <a14:hiddenFill xmlns="" xmlns:a14="http://schemas.microsoft.com/office/drawing/2010/main">
                 <a:solidFill>
                   <a:srgbClr val="FFFFFF"/>
                 </a:solidFill>
               </a14:hiddenFill>
             </a:ext>
             <a:ext uri="{91240B29-F687-4f45-9708-019B960494DF}">
-              <a14:hiddenLine xmlns:a14="http://schemas.microsoft.com/office/drawing/2010/main" xmlns="" w="9525">
+              <a14:hiddenLine xmlns="" xmlns:a14="http://schemas.microsoft.com/office/drawing/2010/main" w="9525">
                 <a:solidFill>
                   <a:srgbClr val="000000"/>
                 </a:solidFill>
@@ -15481,14 +15568,14 @@
           </a:prstGeom>
           <a:extLst>
             <a:ext uri="{909E8E84-426E-40dd-AFC4-6F175D3DCCD1}">
-              <a14:hiddenFill xmlns:a14="http://schemas.microsoft.com/office/drawing/2010/main" xmlns="">
+              <a14:hiddenFill xmlns="" xmlns:a14="http://schemas.microsoft.com/office/drawing/2010/main">
                 <a:solidFill>
                   <a:srgbClr val="FFFFFF"/>
                 </a:solidFill>
               </a14:hiddenFill>
             </a:ext>
             <a:ext uri="{91240B29-F687-4f45-9708-019B960494DF}">
-              <a14:hiddenLine xmlns:a14="http://schemas.microsoft.com/office/drawing/2010/main" xmlns="" w="9525">
+              <a14:hiddenLine xmlns="" xmlns:a14="http://schemas.microsoft.com/office/drawing/2010/main" w="9525">
                 <a:solidFill>
                   <a:srgbClr val="000000"/>
                 </a:solidFill>
@@ -16175,14 +16262,14 @@
           </a:prstGeom>
           <a:extLst>
             <a:ext uri="{909E8E84-426E-40dd-AFC4-6F175D3DCCD1}">
-              <a14:hiddenFill xmlns:a14="http://schemas.microsoft.com/office/drawing/2010/main" xmlns="">
+              <a14:hiddenFill xmlns="" xmlns:a14="http://schemas.microsoft.com/office/drawing/2010/main">
                 <a:solidFill>
                   <a:srgbClr val="FFFFFF"/>
                 </a:solidFill>
               </a14:hiddenFill>
             </a:ext>
             <a:ext uri="{91240B29-F687-4f45-9708-019B960494DF}">
-              <a14:hiddenLine xmlns:a14="http://schemas.microsoft.com/office/drawing/2010/main" xmlns="" w="9525">
+              <a14:hiddenLine xmlns="" xmlns:a14="http://schemas.microsoft.com/office/drawing/2010/main" w="9525">
                 <a:solidFill>
                   <a:srgbClr val="000000"/>
                 </a:solidFill>
@@ -16869,14 +16956,14 @@
           </a:prstGeom>
           <a:extLst>
             <a:ext uri="{909E8E84-426E-40dd-AFC4-6F175D3DCCD1}">
-              <a14:hiddenFill xmlns:a14="http://schemas.microsoft.com/office/drawing/2010/main" xmlns="">
+              <a14:hiddenFill xmlns="" xmlns:a14="http://schemas.microsoft.com/office/drawing/2010/main">
                 <a:solidFill>
                   <a:srgbClr val="FFFFFF"/>
                 </a:solidFill>
               </a14:hiddenFill>
             </a:ext>
             <a:ext uri="{91240B29-F687-4f45-9708-019B960494DF}">
-              <a14:hiddenLine xmlns:a14="http://schemas.microsoft.com/office/drawing/2010/main" xmlns="" w="9525">
+              <a14:hiddenLine xmlns="" xmlns:a14="http://schemas.microsoft.com/office/drawing/2010/main" w="9525">
                 <a:solidFill>
                   <a:srgbClr val="000000"/>
                 </a:solidFill>
@@ -17113,14 +17200,14 @@
           </a:prstGeom>
           <a:extLst>
             <a:ext uri="{909E8E84-426E-40dd-AFC4-6F175D3DCCD1}">
-              <a14:hiddenFill xmlns:a14="http://schemas.microsoft.com/office/drawing/2010/main" xmlns="">
+              <a14:hiddenFill xmlns="" xmlns:a14="http://schemas.microsoft.com/office/drawing/2010/main">
                 <a:solidFill>
                   <a:srgbClr val="FFFFFF"/>
                 </a:solidFill>
               </a14:hiddenFill>
             </a:ext>
             <a:ext uri="{91240B29-F687-4f45-9708-019B960494DF}">
-              <a14:hiddenLine xmlns:a14="http://schemas.microsoft.com/office/drawing/2010/main" xmlns="" w="9525">
+              <a14:hiddenLine xmlns="" xmlns:a14="http://schemas.microsoft.com/office/drawing/2010/main" w="9525">
                 <a:solidFill>
                   <a:srgbClr val="000000"/>
                 </a:solidFill>
@@ -17327,14 +17414,14 @@
           </a:prstGeom>
           <a:extLst>
             <a:ext uri="{909E8E84-426E-40dd-AFC4-6F175D3DCCD1}">
-              <a14:hiddenFill xmlns="" xmlns:a14="http://schemas.microsoft.com/office/drawing/2010/main">
+              <a14:hiddenFill xmlns:a14="http://schemas.microsoft.com/office/drawing/2010/main" xmlns="">
                 <a:solidFill>
                   <a:srgbClr val="FFFFFF"/>
                 </a:solidFill>
               </a14:hiddenFill>
             </a:ext>
             <a:ext uri="{91240B29-F687-4f45-9708-019B960494DF}">
-              <a14:hiddenLine xmlns="" xmlns:a14="http://schemas.microsoft.com/office/drawing/2010/main" w="9525">
+              <a14:hiddenLine xmlns:a14="http://schemas.microsoft.com/office/drawing/2010/main" xmlns="" w="9525">
                 <a:solidFill>
                   <a:srgbClr val="000000"/>
                 </a:solidFill>
@@ -17550,7 +17637,7 @@
                 <a:latin typeface="Helvetica Neue Thin" panose="020B0403020202020204" pitchFamily="34" charset="0"/>
                 <a:ea typeface="Helvetica Neue Thin" panose="020B0403020202020204" pitchFamily="34" charset="0"/>
               </a:rPr>
-              <a:t>Code:</a:t>
+              <a:t>R Code:</a:t>
             </a:r>
           </a:p>
           <a:p>
@@ -18103,14 +18190,14 @@
           </a:prstGeom>
           <a:extLst>
             <a:ext uri="{909E8E84-426E-40dd-AFC4-6F175D3DCCD1}">
-              <a14:hiddenFill xmlns:a14="http://schemas.microsoft.com/office/drawing/2010/main" xmlns="">
+              <a14:hiddenFill xmlns="" xmlns:a14="http://schemas.microsoft.com/office/drawing/2010/main">
                 <a:solidFill>
                   <a:srgbClr val="FFFFFF"/>
                 </a:solidFill>
               </a14:hiddenFill>
             </a:ext>
             <a:ext uri="{91240B29-F687-4f45-9708-019B960494DF}">
-              <a14:hiddenLine xmlns:a14="http://schemas.microsoft.com/office/drawing/2010/main" xmlns="" w="9525">
+              <a14:hiddenLine xmlns="" xmlns:a14="http://schemas.microsoft.com/office/drawing/2010/main" w="9525">
                 <a:solidFill>
                   <a:srgbClr val="000000"/>
                 </a:solidFill>
@@ -18812,14 +18899,14 @@
           </a:prstGeom>
           <a:extLst>
             <a:ext uri="{909E8E84-426E-40dd-AFC4-6F175D3DCCD1}">
-              <a14:hiddenFill xmlns:a14="http://schemas.microsoft.com/office/drawing/2010/main" xmlns="">
+              <a14:hiddenFill xmlns="" xmlns:a14="http://schemas.microsoft.com/office/drawing/2010/main">
                 <a:solidFill>
                   <a:srgbClr val="FFFFFF"/>
                 </a:solidFill>
               </a14:hiddenFill>
             </a:ext>
             <a:ext uri="{91240B29-F687-4f45-9708-019B960494DF}">
-              <a14:hiddenLine xmlns:a14="http://schemas.microsoft.com/office/drawing/2010/main" xmlns="" w="9525">
+              <a14:hiddenLine xmlns="" xmlns:a14="http://schemas.microsoft.com/office/drawing/2010/main" w="9525">
                 <a:solidFill>
                   <a:srgbClr val="000000"/>
                 </a:solidFill>
@@ -19147,14 +19234,14 @@
           </a:prstGeom>
           <a:extLst>
             <a:ext uri="{909E8E84-426E-40dd-AFC4-6F175D3DCCD1}">
-              <a14:hiddenFill xmlns:a14="http://schemas.microsoft.com/office/drawing/2010/main" xmlns="">
+              <a14:hiddenFill xmlns="" xmlns:a14="http://schemas.microsoft.com/office/drawing/2010/main">
                 <a:solidFill>
                   <a:srgbClr val="FFFFFF"/>
                 </a:solidFill>
               </a14:hiddenFill>
             </a:ext>
             <a:ext uri="{91240B29-F687-4f45-9708-019B960494DF}">
-              <a14:hiddenLine xmlns:a14="http://schemas.microsoft.com/office/drawing/2010/main" xmlns="" w="9525">
+              <a14:hiddenLine xmlns="" xmlns:a14="http://schemas.microsoft.com/office/drawing/2010/main" w="9525">
                 <a:solidFill>
                   <a:srgbClr val="000000"/>
                 </a:solidFill>
@@ -19727,14 +19814,14 @@
           </a:prstGeom>
           <a:extLst>
             <a:ext uri="{909E8E84-426E-40dd-AFC4-6F175D3DCCD1}">
-              <a14:hiddenFill xmlns:a14="http://schemas.microsoft.com/office/drawing/2010/main" xmlns="">
+              <a14:hiddenFill xmlns="" xmlns:a14="http://schemas.microsoft.com/office/drawing/2010/main">
                 <a:solidFill>
                   <a:srgbClr val="FFFFFF"/>
                 </a:solidFill>
               </a14:hiddenFill>
             </a:ext>
             <a:ext uri="{91240B29-F687-4f45-9708-019B960494DF}">
-              <a14:hiddenLine xmlns:a14="http://schemas.microsoft.com/office/drawing/2010/main" xmlns="" w="9525">
+              <a14:hiddenLine xmlns="" xmlns:a14="http://schemas.microsoft.com/office/drawing/2010/main" w="9525">
                 <a:solidFill>
                   <a:srgbClr val="000000"/>
                 </a:solidFill>
@@ -20534,14 +20621,14 @@
           </a:prstGeom>
           <a:extLst>
             <a:ext uri="{909E8E84-426E-40dd-AFC4-6F175D3DCCD1}">
-              <a14:hiddenFill xmlns:a14="http://schemas.microsoft.com/office/drawing/2010/main" xmlns="">
+              <a14:hiddenFill xmlns="" xmlns:a14="http://schemas.microsoft.com/office/drawing/2010/main">
                 <a:solidFill>
                   <a:srgbClr val="FFFFFF"/>
                 </a:solidFill>
               </a14:hiddenFill>
             </a:ext>
             <a:ext uri="{91240B29-F687-4f45-9708-019B960494DF}">
-              <a14:hiddenLine xmlns:a14="http://schemas.microsoft.com/office/drawing/2010/main" xmlns="" w="9525">
+              <a14:hiddenLine xmlns="" xmlns:a14="http://schemas.microsoft.com/office/drawing/2010/main" w="9525">
                 <a:solidFill>
                   <a:srgbClr val="000000"/>
                 </a:solidFill>
@@ -21688,14 +21775,14 @@
           </a:prstGeom>
           <a:extLst>
             <a:ext uri="{909E8E84-426E-40dd-AFC4-6F175D3DCCD1}">
-              <a14:hiddenFill xmlns:a14="http://schemas.microsoft.com/office/drawing/2010/main" xmlns="">
+              <a14:hiddenFill xmlns="" xmlns:a14="http://schemas.microsoft.com/office/drawing/2010/main">
                 <a:solidFill>
                   <a:srgbClr val="FFFFFF"/>
                 </a:solidFill>
               </a14:hiddenFill>
             </a:ext>
             <a:ext uri="{91240B29-F687-4f45-9708-019B960494DF}">
-              <a14:hiddenLine xmlns:a14="http://schemas.microsoft.com/office/drawing/2010/main" xmlns="" w="9525">
+              <a14:hiddenLine xmlns="" xmlns:a14="http://schemas.microsoft.com/office/drawing/2010/main" w="9525">
                 <a:solidFill>
                   <a:srgbClr val="000000"/>
                 </a:solidFill>
@@ -21902,14 +21989,14 @@
           </a:prstGeom>
           <a:extLst>
             <a:ext uri="{909E8E84-426E-40dd-AFC4-6F175D3DCCD1}">
-              <a14:hiddenFill xmlns:a14="http://schemas.microsoft.com/office/drawing/2010/main" xmlns="">
+              <a14:hiddenFill xmlns="" xmlns:a14="http://schemas.microsoft.com/office/drawing/2010/main">
                 <a:solidFill>
                   <a:srgbClr val="FFFFFF"/>
                 </a:solidFill>
               </a14:hiddenFill>
             </a:ext>
             <a:ext uri="{91240B29-F687-4f45-9708-019B960494DF}">
-              <a14:hiddenLine xmlns:a14="http://schemas.microsoft.com/office/drawing/2010/main" xmlns="" w="9525">
+              <a14:hiddenLine xmlns="" xmlns:a14="http://schemas.microsoft.com/office/drawing/2010/main" w="9525">
                 <a:solidFill>
                   <a:srgbClr val="000000"/>
                 </a:solidFill>
@@ -22543,14 +22630,14 @@
           </a:prstGeom>
           <a:extLst>
             <a:ext uri="{909E8E84-426E-40dd-AFC4-6F175D3DCCD1}">
-              <a14:hiddenFill xmlns:a14="http://schemas.microsoft.com/office/drawing/2010/main" xmlns="">
+              <a14:hiddenFill xmlns="" xmlns:a14="http://schemas.microsoft.com/office/drawing/2010/main">
                 <a:solidFill>
                   <a:srgbClr val="FFFFFF"/>
                 </a:solidFill>
               </a14:hiddenFill>
             </a:ext>
             <a:ext uri="{91240B29-F687-4f45-9708-019B960494DF}">
-              <a14:hiddenLine xmlns:a14="http://schemas.microsoft.com/office/drawing/2010/main" xmlns="" w="9525">
+              <a14:hiddenLine xmlns="" xmlns:a14="http://schemas.microsoft.com/office/drawing/2010/main" w="9525">
                 <a:solidFill>
                   <a:srgbClr val="000000"/>
                 </a:solidFill>
@@ -23220,14 +23307,14 @@
           </a:prstGeom>
           <a:extLst>
             <a:ext uri="{909E8E84-426E-40dd-AFC4-6F175D3DCCD1}">
-              <a14:hiddenFill xmlns:a14="http://schemas.microsoft.com/office/drawing/2010/main" xmlns="">
+              <a14:hiddenFill xmlns="" xmlns:a14="http://schemas.microsoft.com/office/drawing/2010/main">
                 <a:solidFill>
                   <a:srgbClr val="FFFFFF"/>
                 </a:solidFill>
               </a14:hiddenFill>
             </a:ext>
             <a:ext uri="{91240B29-F687-4f45-9708-019B960494DF}">
-              <a14:hiddenLine xmlns:a14="http://schemas.microsoft.com/office/drawing/2010/main" xmlns="" w="9525">
+              <a14:hiddenLine xmlns="" xmlns:a14="http://schemas.microsoft.com/office/drawing/2010/main" w="9525">
                 <a:solidFill>
                   <a:srgbClr val="000000"/>
                 </a:solidFill>
@@ -24151,14 +24238,14 @@
           </a:prstGeom>
           <a:extLst>
             <a:ext uri="{909E8E84-426E-40dd-AFC4-6F175D3DCCD1}">
-              <a14:hiddenFill xmlns:a14="http://schemas.microsoft.com/office/drawing/2010/main" xmlns="">
+              <a14:hiddenFill xmlns="" xmlns:a14="http://schemas.microsoft.com/office/drawing/2010/main">
                 <a:solidFill>
                   <a:srgbClr val="FFFFFF"/>
                 </a:solidFill>
               </a14:hiddenFill>
             </a:ext>
             <a:ext uri="{91240B29-F687-4f45-9708-019B960494DF}">
-              <a14:hiddenLine xmlns:a14="http://schemas.microsoft.com/office/drawing/2010/main" xmlns="" w="9525">
+              <a14:hiddenLine xmlns="" xmlns:a14="http://schemas.microsoft.com/office/drawing/2010/main" w="9525">
                 <a:solidFill>
                   <a:srgbClr val="000000"/>
                 </a:solidFill>
@@ -24365,14 +24452,14 @@
           </a:prstGeom>
           <a:extLst>
             <a:ext uri="{909E8E84-426E-40dd-AFC4-6F175D3DCCD1}">
-              <a14:hiddenFill xmlns:a14="http://schemas.microsoft.com/office/drawing/2010/main" xmlns="">
+              <a14:hiddenFill xmlns="" xmlns:a14="http://schemas.microsoft.com/office/drawing/2010/main">
                 <a:solidFill>
                   <a:srgbClr val="FFFFFF"/>
                 </a:solidFill>
               </a14:hiddenFill>
             </a:ext>
             <a:ext uri="{91240B29-F687-4f45-9708-019B960494DF}">
-              <a14:hiddenLine xmlns:a14="http://schemas.microsoft.com/office/drawing/2010/main" xmlns="" w="9525">
+              <a14:hiddenLine xmlns="" xmlns:a14="http://schemas.microsoft.com/office/drawing/2010/main" w="9525">
                 <a:solidFill>
                   <a:srgbClr val="000000"/>
                 </a:solidFill>
@@ -25017,14 +25104,14 @@
           </a:prstGeom>
           <a:extLst>
             <a:ext uri="{909E8E84-426E-40dd-AFC4-6F175D3DCCD1}">
-              <a14:hiddenFill xmlns="" xmlns:a14="http://schemas.microsoft.com/office/drawing/2010/main">
+              <a14:hiddenFill xmlns:a14="http://schemas.microsoft.com/office/drawing/2010/main" xmlns="">
                 <a:solidFill>
                   <a:srgbClr val="FFFFFF"/>
                 </a:solidFill>
               </a14:hiddenFill>
             </a:ext>
             <a:ext uri="{91240B29-F687-4f45-9708-019B960494DF}">
-              <a14:hiddenLine xmlns="" xmlns:a14="http://schemas.microsoft.com/office/drawing/2010/main" w="9525">
+              <a14:hiddenLine xmlns:a14="http://schemas.microsoft.com/office/drawing/2010/main" xmlns="" w="9525">
                 <a:solidFill>
                   <a:srgbClr val="000000"/>
                 </a:solidFill>
@@ -26324,14 +26411,14 @@
           </a:prstGeom>
           <a:extLst>
             <a:ext uri="{909E8E84-426E-40dd-AFC4-6F175D3DCCD1}">
-              <a14:hiddenFill xmlns="" xmlns:a14="http://schemas.microsoft.com/office/drawing/2010/main">
+              <a14:hiddenFill xmlns:a14="http://schemas.microsoft.com/office/drawing/2010/main" xmlns="">
                 <a:solidFill>
                   <a:srgbClr val="FFFFFF"/>
                 </a:solidFill>
               </a14:hiddenFill>
             </a:ext>
             <a:ext uri="{91240B29-F687-4f45-9708-019B960494DF}">
-              <a14:hiddenLine xmlns="" xmlns:a14="http://schemas.microsoft.com/office/drawing/2010/main" w="9525">
+              <a14:hiddenLine xmlns:a14="http://schemas.microsoft.com/office/drawing/2010/main" xmlns="" w="9525">
                 <a:solidFill>
                   <a:srgbClr val="000000"/>
                 </a:solidFill>
@@ -27042,14 +27129,14 @@
           </a:prstGeom>
           <a:extLst>
             <a:ext uri="{909E8E84-426E-40dd-AFC4-6F175D3DCCD1}">
-              <a14:hiddenFill xmlns="" xmlns:a14="http://schemas.microsoft.com/office/drawing/2010/main">
+              <a14:hiddenFill xmlns:a14="http://schemas.microsoft.com/office/drawing/2010/main" xmlns="">
                 <a:solidFill>
                   <a:srgbClr val="FFFFFF"/>
                 </a:solidFill>
               </a14:hiddenFill>
             </a:ext>
             <a:ext uri="{91240B29-F687-4f45-9708-019B960494DF}">
-              <a14:hiddenLine xmlns="" xmlns:a14="http://schemas.microsoft.com/office/drawing/2010/main" w="9525">
+              <a14:hiddenLine xmlns:a14="http://schemas.microsoft.com/office/drawing/2010/main" xmlns="" w="9525">
                 <a:solidFill>
                   <a:srgbClr val="000000"/>
                 </a:solidFill>
@@ -27313,14 +27400,14 @@
           </a:prstGeom>
           <a:extLst>
             <a:ext uri="{909E8E84-426E-40dd-AFC4-6F175D3DCCD1}">
-              <a14:hiddenFill xmlns:a14="http://schemas.microsoft.com/office/drawing/2010/main" xmlns="">
+              <a14:hiddenFill xmlns="" xmlns:a14="http://schemas.microsoft.com/office/drawing/2010/main">
                 <a:solidFill>
                   <a:srgbClr val="FFFFFF"/>
                 </a:solidFill>
               </a14:hiddenFill>
             </a:ext>
             <a:ext uri="{91240B29-F687-4f45-9708-019B960494DF}">
-              <a14:hiddenLine xmlns:a14="http://schemas.microsoft.com/office/drawing/2010/main" xmlns="" w="9525">
+              <a14:hiddenLine xmlns="" xmlns:a14="http://schemas.microsoft.com/office/drawing/2010/main" w="9525">
                 <a:solidFill>
                   <a:srgbClr val="000000"/>
                 </a:solidFill>
@@ -27766,7 +27853,7 @@
 </file>
 
 <file path=ppt/slides/slide39.xml><?xml version="1.0" encoding="utf-8"?>
-<p:sld xmlns:a="http://schemas.openxmlformats.org/drawingml/2006/main" xmlns:r="http://schemas.openxmlformats.org/officeDocument/2006/relationships" xmlns:p="http://schemas.openxmlformats.org/presentationml/2006/main" showMasterSp="0">
+<p:sld xmlns:a="http://schemas.openxmlformats.org/drawingml/2006/main" xmlns:r="http://schemas.openxmlformats.org/officeDocument/2006/relationships" xmlns:p="http://schemas.openxmlformats.org/presentationml/2006/main">
   <p:cSld>
     <p:spTree>
       <p:nvGrpSpPr>
@@ -27784,85 +27871,133 @@
       </p:grpSpPr>
       <p:sp>
         <p:nvSpPr>
-          <p:cNvPr id="4" name="TextBox 3">
+          <p:cNvPr id="6" name="Rectangle 5">
             <a:extLst>
               <a:ext uri="{FF2B5EF4-FFF2-40B4-BE49-F238E27FC236}">
-                <a16:creationId xmlns:a16="http://schemas.microsoft.com/office/drawing/2014/main" id="{6012FF62-244C-7A46-8D15-2D1E6ED7A701}"/>
+                <a16:creationId xmlns:a16="http://schemas.microsoft.com/office/drawing/2014/main" id="{19310937-9810-114F-983E-4800E87EE95A}"/>
               </a:ext>
             </a:extLst>
           </p:cNvPr>
-          <p:cNvSpPr txBox="1"/>
+          <p:cNvSpPr/>
           <p:nvPr/>
         </p:nvSpPr>
         <p:spPr>
           <a:xfrm>
-            <a:off x="312785" y="2323508"/>
-            <a:ext cx="11566425" cy="1200329"/>
+            <a:off x="0" y="0"/>
+            <a:ext cx="12192000" cy="6858000"/>
           </a:xfrm>
           <a:prstGeom prst="rect">
             <a:avLst/>
           </a:prstGeom>
-          <a:noFill/>
-        </p:spPr>
+          <a:solidFill>
+            <a:srgbClr val="008CE6"/>
+          </a:solidFill>
+          <a:ln>
+            <a:solidFill>
+              <a:srgbClr val="009193"/>
+            </a:solidFill>
+          </a:ln>
+        </p:spPr>
+        <p:style>
+          <a:lnRef idx="2">
+            <a:schemeClr val="accent1">
+              <a:shade val="50000"/>
+            </a:schemeClr>
+          </a:lnRef>
+          <a:fillRef idx="1">
+            <a:schemeClr val="accent1"/>
+          </a:fillRef>
+          <a:effectRef idx="0">
+            <a:schemeClr val="accent1"/>
+          </a:effectRef>
+          <a:fontRef idx="minor">
+            <a:schemeClr val="lt1"/>
+          </a:fontRef>
+        </p:style>
         <p:txBody>
-          <a:bodyPr wrap="square" rtlCol="0" anchor="ctr">
-            <a:spAutoFit/>
-          </a:bodyPr>
+          <a:bodyPr rtlCol="0" anchor="ctr"/>
           <a:lstStyle/>
           <a:p>
             <a:pPr algn="ctr"/>
-            <a:r>
-              <a:rPr lang="en-GB" sz="3600" b="1" dirty="0">
-                <a:latin typeface="HELVETICA NEUE THIN" panose="020B0403020202020204" pitchFamily="34" charset="0"/>
-                <a:ea typeface="HELVETICA NEUE THIN" panose="020B0403020202020204" pitchFamily="34" charset="0"/>
-              </a:rPr>
-              <a:t>Any questions?</a:t>
-            </a:r>
-          </a:p>
-          <a:p>
-            <a:pPr algn="ctr"/>
-            <a:endParaRPr lang="en-GB" sz="3600" b="1" dirty="0">
-              <a:latin typeface="HELVETICA NEUE THIN" panose="020B0403020202020204" pitchFamily="34" charset="0"/>
-              <a:ea typeface="HELVETICA NEUE THIN" panose="020B0403020202020204" pitchFamily="34" charset="0"/>
-            </a:endParaRPr>
+            <a:endParaRPr lang="en-US"/>
           </a:p>
         </p:txBody>
       </p:sp>
-      <p:pic>
-        <p:nvPicPr>
-          <p:cNvPr id="2" name="Picture 1">
+      <p:sp>
+        <p:nvSpPr>
+          <p:cNvPr id="5" name="Title 1">
             <a:extLst>
               <a:ext uri="{FF2B5EF4-FFF2-40B4-BE49-F238E27FC236}">
-                <a16:creationId xmlns:a16="http://schemas.microsoft.com/office/drawing/2014/main" id="{4BD26486-2D98-5D24-CA61-485F364F66CB}"/>
+                <a16:creationId xmlns:a16="http://schemas.microsoft.com/office/drawing/2014/main" id="{C76F1414-123F-A64D-A741-24140E769A2A}"/>
               </a:ext>
             </a:extLst>
           </p:cNvPr>
-          <p:cNvPicPr>
-            <a:picLocks noChangeAspect="1"/>
-          </p:cNvPicPr>
-          <p:nvPr/>
-        </p:nvPicPr>
-        <p:blipFill rotWithShape="1">
-          <a:blip r:embed="rId2"/>
-          <a:srcRect l="78750"/>
-          <a:stretch/>
-        </p:blipFill>
-        <p:spPr>
-          <a:xfrm>
-            <a:off x="4616058" y="4041251"/>
-            <a:ext cx="2959883" cy="1108264"/>
-          </a:xfrm>
-          <a:prstGeom prst="rect">
-            <a:avLst/>
-          </a:prstGeom>
-        </p:spPr>
-      </p:pic>
+          <p:cNvSpPr>
+            <a:spLocks noGrp="1"/>
+          </p:cNvSpPr>
+          <p:nvPr>
+            <p:ph type="title"/>
+          </p:nvPr>
+        </p:nvSpPr>
+        <p:spPr>
+          <a:xfrm>
+            <a:off x="125696" y="2964639"/>
+            <a:ext cx="11690252" cy="1296988"/>
+          </a:xfrm>
+        </p:spPr>
+        <p:txBody>
+          <a:bodyPr/>
+          <a:lstStyle/>
+          <a:p>
+            <a:pPr lvl="0" algn="ctr" eaLnBrk="0" fontAlgn="base" hangingPunct="0">
+              <a:lnSpc>
+                <a:spcPct val="100000"/>
+              </a:lnSpc>
+              <a:spcBef>
+                <a:spcPct val="20000"/>
+              </a:spcBef>
+              <a:spcAft>
+                <a:spcPct val="0"/>
+              </a:spcAft>
+            </a:pPr>
+            <a:r>
+              <a:rPr lang="en-US" sz="3600" b="1" kern="0" dirty="0">
+                <a:solidFill>
+                  <a:schemeClr val="bg1"/>
+                </a:solidFill>
+                <a:latin typeface="Helvetica Neue Light" panose="02000403000000020004" pitchFamily="2" charset="0"/>
+                <a:ea typeface="Helvetica Neue Light" panose="02000403000000020004" pitchFamily="2" charset="0"/>
+                <a:cs typeface="Helvetica Neue" panose="02000503000000020004" pitchFamily="2" charset="0"/>
+              </a:rPr>
+              <a:t>Live demonstration time – Cleaning and Plotting in R</a:t>
+            </a:r>
+            <a:br>
+              <a:rPr lang="en-US" sz="3600" b="1" kern="0" dirty="0">
+                <a:solidFill>
+                  <a:schemeClr val="bg1"/>
+                </a:solidFill>
+                <a:latin typeface="Helvetica Neue Light" panose="02000403000000020004" pitchFamily="2" charset="0"/>
+                <a:ea typeface="Helvetica Neue Light" panose="02000403000000020004" pitchFamily="2" charset="0"/>
+                <a:cs typeface="Helvetica Neue" panose="02000503000000020004" pitchFamily="2" charset="0"/>
+              </a:rPr>
+            </a:br>
+            <a:endParaRPr lang="en-US" sz="3600" b="1" kern="0" dirty="0">
+              <a:solidFill>
+                <a:schemeClr val="bg1"/>
+              </a:solidFill>
+              <a:latin typeface="Helvetica Neue Light" panose="02000403000000020004" pitchFamily="2" charset="0"/>
+              <a:ea typeface="Helvetica Neue Light" panose="02000403000000020004" pitchFamily="2" charset="0"/>
+              <a:cs typeface="Helvetica Neue" panose="02000503000000020004" pitchFamily="2" charset="0"/>
+            </a:endParaRPr>
+          </a:p>
+        </p:txBody>
+      </p:sp>
       <p:sp>
         <p:nvSpPr>
           <p:cNvPr id="3" name="Slide Number Placeholder 3">
             <a:extLst>
               <a:ext uri="{FF2B5EF4-FFF2-40B4-BE49-F238E27FC236}">
-                <a16:creationId xmlns:a16="http://schemas.microsoft.com/office/drawing/2014/main" id="{2BBD301D-32C4-58B7-C952-8E1D451B8ACD}"/>
+                <a16:creationId xmlns:a16="http://schemas.microsoft.com/office/drawing/2014/main" id="{E9C311CD-DB41-A01D-34A2-AE325A315EC8}"/>
               </a:ext>
             </a:extLst>
           </p:cNvPr>
@@ -27881,14 +28016,14 @@
           </a:prstGeom>
           <a:extLst>
             <a:ext uri="{909E8E84-426E-40dd-AFC4-6F175D3DCCD1}">
-              <a14:hiddenFill xmlns:a14="http://schemas.microsoft.com/office/drawing/2010/main" xmlns="">
+              <a14:hiddenFill xmlns="" xmlns:a14="http://schemas.microsoft.com/office/drawing/2010/main">
                 <a:solidFill>
                   <a:srgbClr val="FFFFFF"/>
                 </a:solidFill>
               </a14:hiddenFill>
             </a:ext>
             <a:ext uri="{91240B29-F687-4f45-9708-019B960494DF}">
-              <a14:hiddenLine xmlns:a14="http://schemas.microsoft.com/office/drawing/2010/main" xmlns="" w="9525">
+              <a14:hiddenLine xmlns="" xmlns:a14="http://schemas.microsoft.com/office/drawing/2010/main" w="9525">
                 <a:solidFill>
                   <a:srgbClr val="000000"/>
                 </a:solidFill>
@@ -28044,7 +28179,7 @@
     </p:spTree>
     <p:extLst>
       <p:ext uri="{BB962C8B-B14F-4D97-AF65-F5344CB8AC3E}">
-        <p14:creationId xmlns:p14="http://schemas.microsoft.com/office/powerpoint/2010/main" val="3930478435"/>
+        <p14:creationId xmlns:p14="http://schemas.microsoft.com/office/powerpoint/2010/main" val="200484312"/>
       </p:ext>
     </p:extLst>
   </p:cSld>
@@ -28125,14 +28260,14 @@
           </a:prstGeom>
           <a:extLst>
             <a:ext uri="{909E8E84-426E-40dd-AFC4-6F175D3DCCD1}">
-              <a14:hiddenFill xmlns:a14="http://schemas.microsoft.com/office/drawing/2010/main" xmlns="">
+              <a14:hiddenFill xmlns="" xmlns:a14="http://schemas.microsoft.com/office/drawing/2010/main">
                 <a:solidFill>
                   <a:srgbClr val="FFFFFF"/>
                 </a:solidFill>
               </a14:hiddenFill>
             </a:ext>
             <a:ext uri="{91240B29-F687-4f45-9708-019B960494DF}">
-              <a14:hiddenLine xmlns:a14="http://schemas.microsoft.com/office/drawing/2010/main" xmlns="" w="9525">
+              <a14:hiddenLine xmlns="" xmlns:a14="http://schemas.microsoft.com/office/drawing/2010/main" w="9525">
                 <a:solidFill>
                   <a:srgbClr val="000000"/>
                 </a:solidFill>
@@ -28307,7 +28442,7 @@
         </p:nvGraphicFramePr>
         <p:xfrm>
           <a:off x="1480671" y="1819697"/>
-          <a:ext cx="9586259" cy="3708400"/>
+          <a:ext cx="9586259" cy="3977640"/>
         </p:xfrm>
         <a:graphic>
           <a:graphicData uri="http://schemas.openxmlformats.org/drawingml/2006/table">
@@ -30365,6 +30500,857 @@
 </p:sld>
 </file>
 
+<file path=ppt/slides/slide40.xml><?xml version="1.0" encoding="utf-8"?>
+<p:sld xmlns:a="http://schemas.openxmlformats.org/drawingml/2006/main" xmlns:r="http://schemas.openxmlformats.org/officeDocument/2006/relationships" xmlns:p="http://schemas.openxmlformats.org/presentationml/2006/main">
+  <p:cSld>
+    <p:spTree>
+      <p:nvGrpSpPr>
+        <p:cNvPr id="1" name=""/>
+        <p:cNvGrpSpPr/>
+        <p:nvPr/>
+      </p:nvGrpSpPr>
+      <p:grpSpPr>
+        <a:xfrm>
+          <a:off x="0" y="0"/>
+          <a:ext cx="0" cy="0"/>
+          <a:chOff x="0" y="0"/>
+          <a:chExt cx="0" cy="0"/>
+        </a:xfrm>
+      </p:grpSpPr>
+      <p:pic>
+        <p:nvPicPr>
+          <p:cNvPr id="3" name="Picture 2" descr="A screenshot of a video game&#10;&#10;Description automatically generated">
+            <a:extLst>
+              <a:ext uri="{FF2B5EF4-FFF2-40B4-BE49-F238E27FC236}">
+                <a16:creationId xmlns:a16="http://schemas.microsoft.com/office/drawing/2014/main" id="{C8E2ED1B-30AC-63D2-07EA-36A681828180}"/>
+              </a:ext>
+            </a:extLst>
+          </p:cNvPr>
+          <p:cNvPicPr>
+            <a:picLocks noChangeAspect="1"/>
+          </p:cNvPicPr>
+          <p:nvPr/>
+        </p:nvPicPr>
+        <p:blipFill>
+          <a:blip r:embed="rId2"/>
+          <a:stretch>
+            <a:fillRect/>
+          </a:stretch>
+        </p:blipFill>
+        <p:spPr>
+          <a:xfrm>
+            <a:off x="113515" y="772581"/>
+            <a:ext cx="8069589" cy="2396907"/>
+          </a:xfrm>
+          <a:prstGeom prst="rect">
+            <a:avLst/>
+          </a:prstGeom>
+        </p:spPr>
+      </p:pic>
+      <p:sp>
+        <p:nvSpPr>
+          <p:cNvPr id="4" name="TextBox 3">
+            <a:extLst>
+              <a:ext uri="{FF2B5EF4-FFF2-40B4-BE49-F238E27FC236}">
+                <a16:creationId xmlns:a16="http://schemas.microsoft.com/office/drawing/2014/main" id="{58085959-3734-49AD-4369-604FBC49F5EF}"/>
+              </a:ext>
+            </a:extLst>
+          </p:cNvPr>
+          <p:cNvSpPr txBox="1"/>
+          <p:nvPr/>
+        </p:nvSpPr>
+        <p:spPr>
+          <a:xfrm>
+            <a:off x="113516" y="162837"/>
+            <a:ext cx="3028008" cy="369332"/>
+          </a:xfrm>
+          <a:prstGeom prst="rect">
+            <a:avLst/>
+          </a:prstGeom>
+          <a:noFill/>
+        </p:spPr>
+        <p:txBody>
+          <a:bodyPr wrap="none" rtlCol="0">
+            <a:spAutoFit/>
+          </a:bodyPr>
+          <a:lstStyle/>
+          <a:p>
+            <a:r>
+              <a:rPr lang="en-GB" b="1" dirty="0">
+                <a:latin typeface="Helvetica Neue" panose="02000503000000020004" pitchFamily="2" charset="0"/>
+                <a:ea typeface="Helvetica Neue" panose="02000503000000020004" pitchFamily="2" charset="0"/>
+                <a:cs typeface="Helvetica Neue" panose="02000503000000020004" pitchFamily="2" charset="0"/>
+              </a:rPr>
+              <a:t>A Video gamer’s statistics</a:t>
+            </a:r>
+          </a:p>
+        </p:txBody>
+      </p:sp>
+      <p:sp>
+        <p:nvSpPr>
+          <p:cNvPr id="5" name="Slide Number Placeholder 3">
+            <a:extLst>
+              <a:ext uri="{FF2B5EF4-FFF2-40B4-BE49-F238E27FC236}">
+                <a16:creationId xmlns:a16="http://schemas.microsoft.com/office/drawing/2014/main" id="{47946FDB-107C-6995-A485-4C418770CA23}"/>
+              </a:ext>
+            </a:extLst>
+          </p:cNvPr>
+          <p:cNvSpPr txBox="1">
+            <a:spLocks/>
+          </p:cNvSpPr>
+          <p:nvPr/>
+        </p:nvSpPr>
+        <p:spPr>
+          <a:xfrm>
+            <a:off x="11275948" y="6373870"/>
+            <a:ext cx="540000" cy="144000"/>
+          </a:xfrm>
+          <a:prstGeom prst="rect">
+            <a:avLst/>
+          </a:prstGeom>
+          <a:extLst>
+            <a:ext uri="{909E8E84-426E-40dd-AFC4-6F175D3DCCD1}">
+              <a14:hiddenFill xmlns="" xmlns:a14="http://schemas.microsoft.com/office/drawing/2010/main">
+                <a:solidFill>
+                  <a:srgbClr val="FFFFFF"/>
+                </a:solidFill>
+              </a14:hiddenFill>
+            </a:ext>
+            <a:ext uri="{91240B29-F687-4f45-9708-019B960494DF}">
+              <a14:hiddenLine xmlns="" xmlns:a14="http://schemas.microsoft.com/office/drawing/2010/main" w="9525">
+                <a:solidFill>
+                  <a:srgbClr val="000000"/>
+                </a:solidFill>
+                <a:miter lim="800000"/>
+                <a:headEnd/>
+                <a:tailEnd/>
+              </a14:hiddenLine>
+            </a:ext>
+          </a:extLst>
+        </p:spPr>
+        <p:txBody>
+          <a:bodyPr/>
+          <a:lstStyle>
+            <a:defPPr>
+              <a:defRPr lang="en-US"/>
+            </a:defPPr>
+            <a:lvl1pPr marL="0" algn="l" defTabSz="914400" rtl="0" eaLnBrk="0" latinLnBrk="0" hangingPunct="0">
+              <a:defRPr sz="1800" kern="1200">
+                <a:solidFill>
+                  <a:schemeClr val="tx1"/>
+                </a:solidFill>
+                <a:latin typeface="Arial" charset="0"/>
+                <a:ea typeface="ＭＳ Ｐゴシック" charset="0"/>
+                <a:cs typeface="Arial" charset="0"/>
+              </a:defRPr>
+            </a:lvl1pPr>
+            <a:lvl2pPr marL="778225" indent="-299317" algn="l" defTabSz="914400" rtl="0" eaLnBrk="0" latinLnBrk="0" hangingPunct="0">
+              <a:defRPr sz="1800" kern="1200">
+                <a:solidFill>
+                  <a:schemeClr val="tx1"/>
+                </a:solidFill>
+                <a:latin typeface="Arial" charset="0"/>
+                <a:ea typeface="Arial" charset="0"/>
+                <a:cs typeface="Arial" charset="0"/>
+              </a:defRPr>
+            </a:lvl2pPr>
+            <a:lvl3pPr marL="1197270" indent="-239454" algn="l" defTabSz="914400" rtl="0" eaLnBrk="0" latinLnBrk="0" hangingPunct="0">
+              <a:defRPr sz="1800" kern="1200">
+                <a:solidFill>
+                  <a:schemeClr val="tx1"/>
+                </a:solidFill>
+                <a:latin typeface="Arial" charset="0"/>
+                <a:ea typeface="Arial" charset="0"/>
+                <a:cs typeface="Arial" charset="0"/>
+              </a:defRPr>
+            </a:lvl3pPr>
+            <a:lvl4pPr marL="1676177" indent="-239454" algn="l" defTabSz="914400" rtl="0" eaLnBrk="0" latinLnBrk="0" hangingPunct="0">
+              <a:defRPr sz="1800" kern="1200">
+                <a:solidFill>
+                  <a:schemeClr val="tx1"/>
+                </a:solidFill>
+                <a:latin typeface="Arial" charset="0"/>
+                <a:ea typeface="Arial" charset="0"/>
+                <a:cs typeface="Arial" charset="0"/>
+              </a:defRPr>
+            </a:lvl4pPr>
+            <a:lvl5pPr marL="2155085" indent="-239454" algn="l" defTabSz="914400" rtl="0" eaLnBrk="0" latinLnBrk="0" hangingPunct="0">
+              <a:defRPr sz="1800" kern="1200">
+                <a:solidFill>
+                  <a:schemeClr val="tx1"/>
+                </a:solidFill>
+                <a:latin typeface="Arial" charset="0"/>
+                <a:ea typeface="Arial" charset="0"/>
+                <a:cs typeface="Arial" charset="0"/>
+              </a:defRPr>
+            </a:lvl5pPr>
+            <a:lvl6pPr marL="2633993" indent="-239454" algn="l" defTabSz="914400" rtl="0" eaLnBrk="0" fontAlgn="base" latinLnBrk="0" hangingPunct="0">
+              <a:spcBef>
+                <a:spcPct val="0"/>
+              </a:spcBef>
+              <a:spcAft>
+                <a:spcPct val="0"/>
+              </a:spcAft>
+              <a:defRPr sz="1800" kern="1200">
+                <a:solidFill>
+                  <a:schemeClr val="tx1"/>
+                </a:solidFill>
+                <a:latin typeface="Arial" charset="0"/>
+                <a:ea typeface="Arial" charset="0"/>
+                <a:cs typeface="Arial" charset="0"/>
+              </a:defRPr>
+            </a:lvl6pPr>
+            <a:lvl7pPr marL="3112901" indent="-239454" algn="l" defTabSz="914400" rtl="0" eaLnBrk="0" fontAlgn="base" latinLnBrk="0" hangingPunct="0">
+              <a:spcBef>
+                <a:spcPct val="0"/>
+              </a:spcBef>
+              <a:spcAft>
+                <a:spcPct val="0"/>
+              </a:spcAft>
+              <a:defRPr sz="1800" kern="1200">
+                <a:solidFill>
+                  <a:schemeClr val="tx1"/>
+                </a:solidFill>
+                <a:latin typeface="Arial" charset="0"/>
+                <a:ea typeface="Arial" charset="0"/>
+                <a:cs typeface="Arial" charset="0"/>
+              </a:defRPr>
+            </a:lvl7pPr>
+            <a:lvl8pPr marL="3591809" indent="-239454" algn="l" defTabSz="914400" rtl="0" eaLnBrk="0" fontAlgn="base" latinLnBrk="0" hangingPunct="0">
+              <a:spcBef>
+                <a:spcPct val="0"/>
+              </a:spcBef>
+              <a:spcAft>
+                <a:spcPct val="0"/>
+              </a:spcAft>
+              <a:defRPr sz="1800" kern="1200">
+                <a:solidFill>
+                  <a:schemeClr val="tx1"/>
+                </a:solidFill>
+                <a:latin typeface="Arial" charset="0"/>
+                <a:ea typeface="Arial" charset="0"/>
+                <a:cs typeface="Arial" charset="0"/>
+              </a:defRPr>
+            </a:lvl8pPr>
+            <a:lvl9pPr marL="4070717" indent="-239454" algn="l" defTabSz="914400" rtl="0" eaLnBrk="0" fontAlgn="base" latinLnBrk="0" hangingPunct="0">
+              <a:spcBef>
+                <a:spcPct val="0"/>
+              </a:spcBef>
+              <a:spcAft>
+                <a:spcPct val="0"/>
+              </a:spcAft>
+              <a:defRPr sz="1800" kern="1200">
+                <a:solidFill>
+                  <a:schemeClr val="tx1"/>
+                </a:solidFill>
+                <a:latin typeface="Arial" charset="0"/>
+                <a:ea typeface="Arial" charset="0"/>
+                <a:cs typeface="Arial" charset="0"/>
+              </a:defRPr>
+            </a:lvl9pPr>
+          </a:lstStyle>
+          <a:p>
+            <a:pPr eaLnBrk="1" hangingPunct="1"/>
+            <a:fld id="{0447D3D2-708A-E34B-88EA-90194C1A2EE9}" type="slidenum">
+              <a:rPr lang="en-US" smtClean="0">
+                <a:solidFill>
+                  <a:srgbClr val="000000"/>
+                </a:solidFill>
+                <a:cs typeface="ＭＳ Ｐゴシック" charset="0"/>
+              </a:rPr>
+              <a:pPr eaLnBrk="1" hangingPunct="1"/>
+              <a:t>40</a:t>
+            </a:fld>
+            <a:endParaRPr lang="en-US" dirty="0">
+              <a:solidFill>
+                <a:srgbClr val="000000"/>
+              </a:solidFill>
+              <a:cs typeface="ＭＳ Ｐゴシック" charset="0"/>
+            </a:endParaRPr>
+          </a:p>
+        </p:txBody>
+      </p:sp>
+      <p:sp>
+        <p:nvSpPr>
+          <p:cNvPr id="6" name="TextBox 5">
+            <a:extLst>
+              <a:ext uri="{FF2B5EF4-FFF2-40B4-BE49-F238E27FC236}">
+                <a16:creationId xmlns:a16="http://schemas.microsoft.com/office/drawing/2014/main" id="{6301B4CF-DB3C-66E7-2320-34BE9A4714A1}"/>
+              </a:ext>
+            </a:extLst>
+          </p:cNvPr>
+          <p:cNvSpPr txBox="1"/>
+          <p:nvPr/>
+        </p:nvSpPr>
+        <p:spPr>
+          <a:xfrm>
+            <a:off x="80474" y="3209845"/>
+            <a:ext cx="4500335" cy="400110"/>
+          </a:xfrm>
+          <a:prstGeom prst="rect">
+            <a:avLst/>
+          </a:prstGeom>
+          <a:noFill/>
+        </p:spPr>
+        <p:txBody>
+          <a:bodyPr wrap="none" rtlCol="0">
+            <a:spAutoFit/>
+          </a:bodyPr>
+          <a:lstStyle/>
+          <a:p>
+            <a:r>
+              <a:rPr lang="en-GB" sz="2000" dirty="0" err="1">
+                <a:latin typeface="Helvetica Neue" panose="02000503000000020004" pitchFamily="2" charset="0"/>
+                <a:ea typeface="Helvetica Neue" panose="02000503000000020004" pitchFamily="2" charset="0"/>
+                <a:cs typeface="Helvetica Neue" panose="02000503000000020004" pitchFamily="2" charset="0"/>
+              </a:rPr>
+              <a:t>PSNProfiles</a:t>
+            </a:r>
+            <a:r>
+              <a:rPr lang="en-GB" sz="2000" dirty="0">
+                <a:latin typeface="Helvetica Neue" panose="02000503000000020004" pitchFamily="2" charset="0"/>
+                <a:ea typeface="Helvetica Neue" panose="02000503000000020004" pitchFamily="2" charset="0"/>
+                <a:cs typeface="Helvetica Neue" panose="02000503000000020004" pitchFamily="2" charset="0"/>
+              </a:rPr>
+              <a:t> (</a:t>
+            </a:r>
+            <a:r>
+              <a:rPr lang="en-GB" sz="2000" dirty="0">
+                <a:latin typeface="Helvetica Neue" panose="02000503000000020004" pitchFamily="2" charset="0"/>
+                <a:ea typeface="Helvetica Neue" panose="02000503000000020004" pitchFamily="2" charset="0"/>
+                <a:cs typeface="Helvetica Neue" panose="02000503000000020004" pitchFamily="2" charset="0"/>
+                <a:hlinkClick r:id="rId3"/>
+              </a:rPr>
+              <a:t>https://psnprofiles.com/</a:t>
+            </a:r>
+            <a:r>
+              <a:rPr lang="en-GB" sz="2000" dirty="0">
+                <a:latin typeface="Helvetica Neue" panose="02000503000000020004" pitchFamily="2" charset="0"/>
+                <a:ea typeface="Helvetica Neue" panose="02000503000000020004" pitchFamily="2" charset="0"/>
+                <a:cs typeface="Helvetica Neue" panose="02000503000000020004" pitchFamily="2" charset="0"/>
+              </a:rPr>
+              <a:t>)</a:t>
+            </a:r>
+          </a:p>
+        </p:txBody>
+      </p:sp>
+      <p:sp>
+        <p:nvSpPr>
+          <p:cNvPr id="7" name="TextBox 6">
+            <a:extLst>
+              <a:ext uri="{FF2B5EF4-FFF2-40B4-BE49-F238E27FC236}">
+                <a16:creationId xmlns:a16="http://schemas.microsoft.com/office/drawing/2014/main" id="{9208E618-AD0B-1C45-3991-91AD9CA45EA3}"/>
+              </a:ext>
+            </a:extLst>
+          </p:cNvPr>
+          <p:cNvSpPr txBox="1"/>
+          <p:nvPr/>
+        </p:nvSpPr>
+        <p:spPr>
+          <a:xfrm>
+            <a:off x="8359825" y="747633"/>
+            <a:ext cx="3718659" cy="2308324"/>
+          </a:xfrm>
+          <a:prstGeom prst="rect">
+            <a:avLst/>
+          </a:prstGeom>
+          <a:noFill/>
+        </p:spPr>
+        <p:txBody>
+          <a:bodyPr wrap="square" rtlCol="0">
+            <a:spAutoFit/>
+          </a:bodyPr>
+          <a:lstStyle/>
+          <a:p>
+            <a:r>
+              <a:rPr lang="en-GB" sz="1600" dirty="0">
+                <a:latin typeface="Arial" panose="020B0604020202020204" pitchFamily="34" charset="0"/>
+                <a:cs typeface="Arial" panose="020B0604020202020204" pitchFamily="34" charset="0"/>
+              </a:rPr>
+              <a:t>We have compiled the following information about the gaming habits of </a:t>
+            </a:r>
+            <a:r>
+              <a:rPr lang="en-GB" sz="1600" b="1" dirty="0">
+                <a:latin typeface="Arial" panose="020B0604020202020204" pitchFamily="34" charset="0"/>
+                <a:cs typeface="Arial" panose="020B0604020202020204" pitchFamily="34" charset="0"/>
+              </a:rPr>
+              <a:t>Anwar Musah </a:t>
+            </a:r>
+            <a:r>
+              <a:rPr lang="en-GB" sz="1600" dirty="0">
+                <a:latin typeface="Arial" panose="020B0604020202020204" pitchFamily="34" charset="0"/>
+                <a:cs typeface="Arial" panose="020B0604020202020204" pitchFamily="34" charset="0"/>
+              </a:rPr>
+              <a:t>(aka </a:t>
+            </a:r>
+            <a:r>
+              <a:rPr lang="en-GB" sz="1600" b="1" dirty="0">
+                <a:latin typeface="Arial" panose="020B0604020202020204" pitchFamily="34" charset="0"/>
+                <a:cs typeface="Arial" panose="020B0604020202020204" pitchFamily="34" charset="0"/>
+              </a:rPr>
+              <a:t>The-PhD-Gamer</a:t>
+            </a:r>
+            <a:r>
+              <a:rPr lang="en-GB" sz="1600" dirty="0">
+                <a:latin typeface="Arial" panose="020B0604020202020204" pitchFamily="34" charset="0"/>
+                <a:cs typeface="Arial" panose="020B0604020202020204" pitchFamily="34" charset="0"/>
+              </a:rPr>
+              <a:t>) across 3 console generations i.e., PlayStation 3, 4 and 5.</a:t>
+            </a:r>
+          </a:p>
+          <a:p>
+            <a:endParaRPr lang="en-GB" sz="1600" dirty="0">
+              <a:latin typeface="Arial" panose="020B0604020202020204" pitchFamily="34" charset="0"/>
+              <a:cs typeface="Arial" panose="020B0604020202020204" pitchFamily="34" charset="0"/>
+            </a:endParaRPr>
+          </a:p>
+          <a:p>
+            <a:r>
+              <a:rPr lang="en-GB" sz="1600" dirty="0">
+                <a:latin typeface="Arial" panose="020B0604020202020204" pitchFamily="34" charset="0"/>
+                <a:cs typeface="Arial" panose="020B0604020202020204" pitchFamily="34" charset="0"/>
+              </a:rPr>
+              <a:t>There are 161 game titles (~6,000 hours of game time) listed in the shared dataset.</a:t>
+            </a:r>
+          </a:p>
+        </p:txBody>
+      </p:sp>
+      <p:pic>
+        <p:nvPicPr>
+          <p:cNvPr id="15" name="Picture 14" descr="A close-up of a list&#10;&#10;Description automatically generated">
+            <a:extLst>
+              <a:ext uri="{FF2B5EF4-FFF2-40B4-BE49-F238E27FC236}">
+                <a16:creationId xmlns:a16="http://schemas.microsoft.com/office/drawing/2014/main" id="{6FA21D37-FBA2-D966-AC98-76DF1DD409E0}"/>
+              </a:ext>
+            </a:extLst>
+          </p:cNvPr>
+          <p:cNvPicPr>
+            <a:picLocks noChangeAspect="1"/>
+          </p:cNvPicPr>
+          <p:nvPr/>
+        </p:nvPicPr>
+        <p:blipFill>
+          <a:blip r:embed="rId4"/>
+          <a:stretch>
+            <a:fillRect/>
+          </a:stretch>
+        </p:blipFill>
+        <p:spPr>
+          <a:xfrm>
+            <a:off x="80474" y="4239197"/>
+            <a:ext cx="7645400" cy="2463800"/>
+          </a:xfrm>
+          <a:prstGeom prst="rect">
+            <a:avLst/>
+          </a:prstGeom>
+        </p:spPr>
+      </p:pic>
+      <p:sp>
+        <p:nvSpPr>
+          <p:cNvPr id="16" name="TextBox 15">
+            <a:extLst>
+              <a:ext uri="{FF2B5EF4-FFF2-40B4-BE49-F238E27FC236}">
+                <a16:creationId xmlns:a16="http://schemas.microsoft.com/office/drawing/2014/main" id="{41E2AEA2-5921-16CF-4459-C002E884C450}"/>
+              </a:ext>
+            </a:extLst>
+          </p:cNvPr>
+          <p:cNvSpPr txBox="1"/>
+          <p:nvPr/>
+        </p:nvSpPr>
+        <p:spPr>
+          <a:xfrm>
+            <a:off x="113515" y="3809517"/>
+            <a:ext cx="4703532" cy="400110"/>
+          </a:xfrm>
+          <a:prstGeom prst="rect">
+            <a:avLst/>
+          </a:prstGeom>
+          <a:noFill/>
+        </p:spPr>
+        <p:txBody>
+          <a:bodyPr wrap="none" rtlCol="0">
+            <a:spAutoFit/>
+          </a:bodyPr>
+          <a:lstStyle/>
+          <a:p>
+            <a:r>
+              <a:rPr lang="en-GB" sz="2000" dirty="0">
+                <a:latin typeface="Arial" panose="020B0604020202020204" pitchFamily="34" charset="0"/>
+                <a:cs typeface="Arial" panose="020B0604020202020204" pitchFamily="34" charset="0"/>
+              </a:rPr>
+              <a:t>Data Descriptor: Downloadable Dataset</a:t>
+            </a:r>
+          </a:p>
+        </p:txBody>
+      </p:sp>
+      <p:sp>
+        <p:nvSpPr>
+          <p:cNvPr id="20" name="TextBox 19">
+            <a:extLst>
+              <a:ext uri="{FF2B5EF4-FFF2-40B4-BE49-F238E27FC236}">
+                <a16:creationId xmlns:a16="http://schemas.microsoft.com/office/drawing/2014/main" id="{C7880BF9-03A3-9C17-03A5-97E7A239D8A3}"/>
+              </a:ext>
+            </a:extLst>
+          </p:cNvPr>
+          <p:cNvSpPr txBox="1"/>
+          <p:nvPr/>
+        </p:nvSpPr>
+        <p:spPr>
+          <a:xfrm>
+            <a:off x="7848599" y="4239197"/>
+            <a:ext cx="4262927" cy="1323439"/>
+          </a:xfrm>
+          <a:prstGeom prst="rect">
+            <a:avLst/>
+          </a:prstGeom>
+          <a:noFill/>
+        </p:spPr>
+        <p:txBody>
+          <a:bodyPr wrap="square" rtlCol="0">
+            <a:spAutoFit/>
+          </a:bodyPr>
+          <a:lstStyle/>
+          <a:p>
+            <a:r>
+              <a:rPr lang="en-GB" sz="1600" dirty="0">
+                <a:latin typeface="Arial" panose="020B0604020202020204" pitchFamily="34" charset="0"/>
+                <a:cs typeface="Arial" panose="020B0604020202020204" pitchFamily="34" charset="0"/>
+              </a:rPr>
+              <a:t>Let’s perform some data management on this dataset and generate some graphs with the base R </a:t>
+            </a:r>
+            <a:r>
+              <a:rPr lang="en-GB" sz="1600" b="1" dirty="0">
+                <a:latin typeface="Arial" panose="020B0604020202020204" pitchFamily="34" charset="0"/>
+                <a:cs typeface="Arial" panose="020B0604020202020204" pitchFamily="34" charset="0"/>
+              </a:rPr>
+              <a:t>plot() </a:t>
+            </a:r>
+            <a:r>
+              <a:rPr lang="en-GB" sz="1600" dirty="0">
+                <a:latin typeface="Arial" panose="020B0604020202020204" pitchFamily="34" charset="0"/>
+                <a:cs typeface="Arial" panose="020B0604020202020204" pitchFamily="34" charset="0"/>
+              </a:rPr>
+              <a:t>function, and with the Tidyverse </a:t>
+            </a:r>
+            <a:r>
+              <a:rPr lang="en-GB" sz="1600" b="1" dirty="0">
+                <a:latin typeface="Arial" panose="020B0604020202020204" pitchFamily="34" charset="0"/>
+                <a:cs typeface="Arial" panose="020B0604020202020204" pitchFamily="34" charset="0"/>
+              </a:rPr>
+              <a:t>ggplot2() </a:t>
+            </a:r>
+            <a:r>
+              <a:rPr lang="en-GB" sz="1600" dirty="0">
+                <a:latin typeface="Arial" panose="020B0604020202020204" pitchFamily="34" charset="0"/>
+                <a:cs typeface="Arial" panose="020B0604020202020204" pitchFamily="34" charset="0"/>
+              </a:rPr>
+              <a:t>function as well to show the two worlds of coding in RStudio.</a:t>
+            </a:r>
+          </a:p>
+        </p:txBody>
+      </p:sp>
+    </p:spTree>
+    <p:extLst>
+      <p:ext uri="{BB962C8B-B14F-4D97-AF65-F5344CB8AC3E}">
+        <p14:creationId xmlns:p14="http://schemas.microsoft.com/office/powerpoint/2010/main" val="2482073802"/>
+      </p:ext>
+    </p:extLst>
+  </p:cSld>
+  <p:clrMapOvr>
+    <a:masterClrMapping/>
+  </p:clrMapOvr>
+</p:sld>
+</file>
+
+<file path=ppt/slides/slide41.xml><?xml version="1.0" encoding="utf-8"?>
+<p:sld xmlns:a="http://schemas.openxmlformats.org/drawingml/2006/main" xmlns:r="http://schemas.openxmlformats.org/officeDocument/2006/relationships" xmlns:p="http://schemas.openxmlformats.org/presentationml/2006/main" showMasterSp="0">
+  <p:cSld>
+    <p:spTree>
+      <p:nvGrpSpPr>
+        <p:cNvPr id="1" name=""/>
+        <p:cNvGrpSpPr/>
+        <p:nvPr/>
+      </p:nvGrpSpPr>
+      <p:grpSpPr>
+        <a:xfrm>
+          <a:off x="0" y="0"/>
+          <a:ext cx="0" cy="0"/>
+          <a:chOff x="0" y="0"/>
+          <a:chExt cx="0" cy="0"/>
+        </a:xfrm>
+      </p:grpSpPr>
+      <p:sp>
+        <p:nvSpPr>
+          <p:cNvPr id="4" name="TextBox 3">
+            <a:extLst>
+              <a:ext uri="{FF2B5EF4-FFF2-40B4-BE49-F238E27FC236}">
+                <a16:creationId xmlns:a16="http://schemas.microsoft.com/office/drawing/2014/main" id="{6012FF62-244C-7A46-8D15-2D1E6ED7A701}"/>
+              </a:ext>
+            </a:extLst>
+          </p:cNvPr>
+          <p:cNvSpPr txBox="1"/>
+          <p:nvPr/>
+        </p:nvSpPr>
+        <p:spPr>
+          <a:xfrm>
+            <a:off x="312785" y="2323508"/>
+            <a:ext cx="11566425" cy="1200329"/>
+          </a:xfrm>
+          <a:prstGeom prst="rect">
+            <a:avLst/>
+          </a:prstGeom>
+          <a:noFill/>
+        </p:spPr>
+        <p:txBody>
+          <a:bodyPr wrap="square" rtlCol="0" anchor="ctr">
+            <a:spAutoFit/>
+          </a:bodyPr>
+          <a:lstStyle/>
+          <a:p>
+            <a:pPr algn="ctr"/>
+            <a:r>
+              <a:rPr lang="en-GB" sz="3600" b="1" dirty="0">
+                <a:latin typeface="HELVETICA NEUE THIN" panose="020B0403020202020204" pitchFamily="34" charset="0"/>
+                <a:ea typeface="HELVETICA NEUE THIN" panose="020B0403020202020204" pitchFamily="34" charset="0"/>
+              </a:rPr>
+              <a:t>Any questions?</a:t>
+            </a:r>
+          </a:p>
+          <a:p>
+            <a:pPr algn="ctr"/>
+            <a:endParaRPr lang="en-GB" sz="3600" b="1" dirty="0">
+              <a:latin typeface="HELVETICA NEUE THIN" panose="020B0403020202020204" pitchFamily="34" charset="0"/>
+              <a:ea typeface="HELVETICA NEUE THIN" panose="020B0403020202020204" pitchFamily="34" charset="0"/>
+            </a:endParaRPr>
+          </a:p>
+        </p:txBody>
+      </p:sp>
+      <p:pic>
+        <p:nvPicPr>
+          <p:cNvPr id="2" name="Picture 1">
+            <a:extLst>
+              <a:ext uri="{FF2B5EF4-FFF2-40B4-BE49-F238E27FC236}">
+                <a16:creationId xmlns:a16="http://schemas.microsoft.com/office/drawing/2014/main" id="{4BD26486-2D98-5D24-CA61-485F364F66CB}"/>
+              </a:ext>
+            </a:extLst>
+          </p:cNvPr>
+          <p:cNvPicPr>
+            <a:picLocks noChangeAspect="1"/>
+          </p:cNvPicPr>
+          <p:nvPr/>
+        </p:nvPicPr>
+        <p:blipFill rotWithShape="1">
+          <a:blip r:embed="rId2"/>
+          <a:srcRect l="78750"/>
+          <a:stretch/>
+        </p:blipFill>
+        <p:spPr>
+          <a:xfrm>
+            <a:off x="4616058" y="4041251"/>
+            <a:ext cx="2959883" cy="1108264"/>
+          </a:xfrm>
+          <a:prstGeom prst="rect">
+            <a:avLst/>
+          </a:prstGeom>
+        </p:spPr>
+      </p:pic>
+      <p:sp>
+        <p:nvSpPr>
+          <p:cNvPr id="3" name="Slide Number Placeholder 3">
+            <a:extLst>
+              <a:ext uri="{FF2B5EF4-FFF2-40B4-BE49-F238E27FC236}">
+                <a16:creationId xmlns:a16="http://schemas.microsoft.com/office/drawing/2014/main" id="{2BBD301D-32C4-58B7-C952-8E1D451B8ACD}"/>
+              </a:ext>
+            </a:extLst>
+          </p:cNvPr>
+          <p:cNvSpPr txBox="1">
+            <a:spLocks/>
+          </p:cNvSpPr>
+          <p:nvPr/>
+        </p:nvSpPr>
+        <p:spPr>
+          <a:xfrm>
+            <a:off x="11275948" y="6373870"/>
+            <a:ext cx="540000" cy="144000"/>
+          </a:xfrm>
+          <a:prstGeom prst="rect">
+            <a:avLst/>
+          </a:prstGeom>
+          <a:extLst>
+            <a:ext uri="{909E8E84-426E-40dd-AFC4-6F175D3DCCD1}">
+              <a14:hiddenFill xmlns="" xmlns:a14="http://schemas.microsoft.com/office/drawing/2010/main">
+                <a:solidFill>
+                  <a:srgbClr val="FFFFFF"/>
+                </a:solidFill>
+              </a14:hiddenFill>
+            </a:ext>
+            <a:ext uri="{91240B29-F687-4f45-9708-019B960494DF}">
+              <a14:hiddenLine xmlns="" xmlns:a14="http://schemas.microsoft.com/office/drawing/2010/main" w="9525">
+                <a:solidFill>
+                  <a:srgbClr val="000000"/>
+                </a:solidFill>
+                <a:miter lim="800000"/>
+                <a:headEnd/>
+                <a:tailEnd/>
+              </a14:hiddenLine>
+            </a:ext>
+          </a:extLst>
+        </p:spPr>
+        <p:txBody>
+          <a:bodyPr/>
+          <a:lstStyle>
+            <a:defPPr>
+              <a:defRPr lang="en-US"/>
+            </a:defPPr>
+            <a:lvl1pPr marL="0" algn="l" defTabSz="914400" rtl="0" eaLnBrk="0" latinLnBrk="0" hangingPunct="0">
+              <a:defRPr sz="1800" kern="1200">
+                <a:solidFill>
+                  <a:schemeClr val="tx1"/>
+                </a:solidFill>
+                <a:latin typeface="Arial" charset="0"/>
+                <a:ea typeface="ＭＳ Ｐゴシック" charset="0"/>
+                <a:cs typeface="Arial" charset="0"/>
+              </a:defRPr>
+            </a:lvl1pPr>
+            <a:lvl2pPr marL="778225" indent="-299317" algn="l" defTabSz="914400" rtl="0" eaLnBrk="0" latinLnBrk="0" hangingPunct="0">
+              <a:defRPr sz="1800" kern="1200">
+                <a:solidFill>
+                  <a:schemeClr val="tx1"/>
+                </a:solidFill>
+                <a:latin typeface="Arial" charset="0"/>
+                <a:ea typeface="Arial" charset="0"/>
+                <a:cs typeface="Arial" charset="0"/>
+              </a:defRPr>
+            </a:lvl2pPr>
+            <a:lvl3pPr marL="1197270" indent="-239454" algn="l" defTabSz="914400" rtl="0" eaLnBrk="0" latinLnBrk="0" hangingPunct="0">
+              <a:defRPr sz="1800" kern="1200">
+                <a:solidFill>
+                  <a:schemeClr val="tx1"/>
+                </a:solidFill>
+                <a:latin typeface="Arial" charset="0"/>
+                <a:ea typeface="Arial" charset="0"/>
+                <a:cs typeface="Arial" charset="0"/>
+              </a:defRPr>
+            </a:lvl3pPr>
+            <a:lvl4pPr marL="1676177" indent="-239454" algn="l" defTabSz="914400" rtl="0" eaLnBrk="0" latinLnBrk="0" hangingPunct="0">
+              <a:defRPr sz="1800" kern="1200">
+                <a:solidFill>
+                  <a:schemeClr val="tx1"/>
+                </a:solidFill>
+                <a:latin typeface="Arial" charset="0"/>
+                <a:ea typeface="Arial" charset="0"/>
+                <a:cs typeface="Arial" charset="0"/>
+              </a:defRPr>
+            </a:lvl4pPr>
+            <a:lvl5pPr marL="2155085" indent="-239454" algn="l" defTabSz="914400" rtl="0" eaLnBrk="0" latinLnBrk="0" hangingPunct="0">
+              <a:defRPr sz="1800" kern="1200">
+                <a:solidFill>
+                  <a:schemeClr val="tx1"/>
+                </a:solidFill>
+                <a:latin typeface="Arial" charset="0"/>
+                <a:ea typeface="Arial" charset="0"/>
+                <a:cs typeface="Arial" charset="0"/>
+              </a:defRPr>
+            </a:lvl5pPr>
+            <a:lvl6pPr marL="2633993" indent="-239454" algn="l" defTabSz="914400" rtl="0" eaLnBrk="0" fontAlgn="base" latinLnBrk="0" hangingPunct="0">
+              <a:spcBef>
+                <a:spcPct val="0"/>
+              </a:spcBef>
+              <a:spcAft>
+                <a:spcPct val="0"/>
+              </a:spcAft>
+              <a:defRPr sz="1800" kern="1200">
+                <a:solidFill>
+                  <a:schemeClr val="tx1"/>
+                </a:solidFill>
+                <a:latin typeface="Arial" charset="0"/>
+                <a:ea typeface="Arial" charset="0"/>
+                <a:cs typeface="Arial" charset="0"/>
+              </a:defRPr>
+            </a:lvl6pPr>
+            <a:lvl7pPr marL="3112901" indent="-239454" algn="l" defTabSz="914400" rtl="0" eaLnBrk="0" fontAlgn="base" latinLnBrk="0" hangingPunct="0">
+              <a:spcBef>
+                <a:spcPct val="0"/>
+              </a:spcBef>
+              <a:spcAft>
+                <a:spcPct val="0"/>
+              </a:spcAft>
+              <a:defRPr sz="1800" kern="1200">
+                <a:solidFill>
+                  <a:schemeClr val="tx1"/>
+                </a:solidFill>
+                <a:latin typeface="Arial" charset="0"/>
+                <a:ea typeface="Arial" charset="0"/>
+                <a:cs typeface="Arial" charset="0"/>
+              </a:defRPr>
+            </a:lvl7pPr>
+            <a:lvl8pPr marL="3591809" indent="-239454" algn="l" defTabSz="914400" rtl="0" eaLnBrk="0" fontAlgn="base" latinLnBrk="0" hangingPunct="0">
+              <a:spcBef>
+                <a:spcPct val="0"/>
+              </a:spcBef>
+              <a:spcAft>
+                <a:spcPct val="0"/>
+              </a:spcAft>
+              <a:defRPr sz="1800" kern="1200">
+                <a:solidFill>
+                  <a:schemeClr val="tx1"/>
+                </a:solidFill>
+                <a:latin typeface="Arial" charset="0"/>
+                <a:ea typeface="Arial" charset="0"/>
+                <a:cs typeface="Arial" charset="0"/>
+              </a:defRPr>
+            </a:lvl8pPr>
+            <a:lvl9pPr marL="4070717" indent="-239454" algn="l" defTabSz="914400" rtl="0" eaLnBrk="0" fontAlgn="base" latinLnBrk="0" hangingPunct="0">
+              <a:spcBef>
+                <a:spcPct val="0"/>
+              </a:spcBef>
+              <a:spcAft>
+                <a:spcPct val="0"/>
+              </a:spcAft>
+              <a:defRPr sz="1800" kern="1200">
+                <a:solidFill>
+                  <a:schemeClr val="tx1"/>
+                </a:solidFill>
+                <a:latin typeface="Arial" charset="0"/>
+                <a:ea typeface="Arial" charset="0"/>
+                <a:cs typeface="Arial" charset="0"/>
+              </a:defRPr>
+            </a:lvl9pPr>
+          </a:lstStyle>
+          <a:p>
+            <a:pPr eaLnBrk="1" hangingPunct="1"/>
+            <a:fld id="{0447D3D2-708A-E34B-88EA-90194C1A2EE9}" type="slidenum">
+              <a:rPr lang="en-US" smtClean="0">
+                <a:solidFill>
+                  <a:srgbClr val="000000"/>
+                </a:solidFill>
+                <a:cs typeface="ＭＳ Ｐゴシック" charset="0"/>
+              </a:rPr>
+              <a:pPr eaLnBrk="1" hangingPunct="1"/>
+              <a:t>41</a:t>
+            </a:fld>
+            <a:endParaRPr lang="en-US" dirty="0">
+              <a:solidFill>
+                <a:srgbClr val="000000"/>
+              </a:solidFill>
+              <a:cs typeface="ＭＳ Ｐゴシック" charset="0"/>
+            </a:endParaRPr>
+          </a:p>
+        </p:txBody>
+      </p:sp>
+    </p:spTree>
+    <p:extLst>
+      <p:ext uri="{BB962C8B-B14F-4D97-AF65-F5344CB8AC3E}">
+        <p14:creationId xmlns:p14="http://schemas.microsoft.com/office/powerpoint/2010/main" val="3930478435"/>
+      </p:ext>
+    </p:extLst>
+  </p:cSld>
+  <p:clrMapOvr>
+    <a:masterClrMapping/>
+  </p:clrMapOvr>
+</p:sld>
+</file>
+
 <file path=ppt/slides/slide5.xml><?xml version="1.0" encoding="utf-8"?>
 <p:sld xmlns:a="http://schemas.openxmlformats.org/drawingml/2006/main" xmlns:r="http://schemas.openxmlformats.org/officeDocument/2006/relationships" xmlns:p="http://schemas.openxmlformats.org/presentationml/2006/main" showMasterSp="0">
   <p:cSld>
@@ -30530,14 +31516,14 @@
           </a:prstGeom>
           <a:extLst>
             <a:ext uri="{909E8E84-426E-40dd-AFC4-6F175D3DCCD1}">
-              <a14:hiddenFill xmlns:a14="http://schemas.microsoft.com/office/drawing/2010/main" xmlns="">
+              <a14:hiddenFill xmlns="" xmlns:a14="http://schemas.microsoft.com/office/drawing/2010/main">
                 <a:solidFill>
                   <a:srgbClr val="FFFFFF"/>
                 </a:solidFill>
               </a14:hiddenFill>
             </a:ext>
             <a:ext uri="{91240B29-F687-4f45-9708-019B960494DF}">
-              <a14:hiddenLine xmlns:a14="http://schemas.microsoft.com/office/drawing/2010/main" xmlns="" w="9525">
+              <a14:hiddenLine xmlns="" xmlns:a14="http://schemas.microsoft.com/office/drawing/2010/main" w="9525">
                 <a:solidFill>
                   <a:srgbClr val="000000"/>
                 </a:solidFill>
@@ -30881,14 +31867,14 @@
           </a:prstGeom>
           <a:extLst>
             <a:ext uri="{909E8E84-426E-40dd-AFC4-6F175D3DCCD1}">
-              <a14:hiddenFill xmlns:a14="http://schemas.microsoft.com/office/drawing/2010/main" xmlns="">
+              <a14:hiddenFill xmlns="" xmlns:a14="http://schemas.microsoft.com/office/drawing/2010/main">
                 <a:solidFill>
                   <a:srgbClr val="FFFFFF"/>
                 </a:solidFill>
               </a14:hiddenFill>
             </a:ext>
             <a:ext uri="{91240B29-F687-4f45-9708-019B960494DF}">
-              <a14:hiddenLine xmlns:a14="http://schemas.microsoft.com/office/drawing/2010/main" xmlns="" w="9525">
+              <a14:hiddenLine xmlns="" xmlns:a14="http://schemas.microsoft.com/office/drawing/2010/main" w="9525">
                 <a:solidFill>
                   <a:srgbClr val="000000"/>
                 </a:solidFill>
@@ -31246,14 +32232,14 @@
           </a:prstGeom>
           <a:extLst>
             <a:ext uri="{909E8E84-426E-40dd-AFC4-6F175D3DCCD1}">
-              <a14:hiddenFill xmlns:a14="http://schemas.microsoft.com/office/drawing/2010/main" xmlns="">
+              <a14:hiddenFill xmlns="" xmlns:a14="http://schemas.microsoft.com/office/drawing/2010/main">
                 <a:solidFill>
                   <a:srgbClr val="FFFFFF"/>
                 </a:solidFill>
               </a14:hiddenFill>
             </a:ext>
             <a:ext uri="{91240B29-F687-4f45-9708-019B960494DF}">
-              <a14:hiddenLine xmlns:a14="http://schemas.microsoft.com/office/drawing/2010/main" xmlns="" w="9525">
+              <a14:hiddenLine xmlns="" xmlns:a14="http://schemas.microsoft.com/office/drawing/2010/main" w="9525">
                 <a:solidFill>
                   <a:srgbClr val="000000"/>
                 </a:solidFill>
@@ -31495,8 +32481,8 @@
         </p:nvSpPr>
         <p:spPr>
           <a:xfrm>
-            <a:off x="838200" y="2172762"/>
-            <a:ext cx="10515600" cy="4351338"/>
+            <a:off x="838200" y="1817268"/>
+            <a:ext cx="10515600" cy="2938410"/>
           </a:xfrm>
         </p:spPr>
         <p:txBody>
@@ -31548,6 +32534,9 @@
             </a:r>
           </a:p>
           <a:p>
+            <a:pPr marL="0" indent="0">
+              <a:buNone/>
+            </a:pPr>
             <a:endParaRPr lang="en-GB" sz="2400" dirty="0">
               <a:latin typeface="Helvetica Neue Thin" panose="020B0403020202020204" pitchFamily="34" charset="0"/>
               <a:ea typeface="Helvetica Neue Thin" panose="020B0403020202020204" pitchFamily="34" charset="0"/>
@@ -31556,29 +32545,20 @@
           <a:p>
             <a:r>
               <a:rPr lang="en-GB" sz="2400" dirty="0">
-                <a:highlight>
-                  <a:srgbClr val="D6D6D6"/>
-                </a:highlight>
                 <a:latin typeface="Helvetica Neue Thin" panose="020B0403020202020204" pitchFamily="34" charset="0"/>
                 <a:ea typeface="Helvetica Neue Thin" panose="020B0403020202020204" pitchFamily="34" charset="0"/>
               </a:rPr>
-              <a:t>To show </a:t>
+              <a:t>To show the </a:t>
             </a:r>
             <a:r>
               <a:rPr lang="en-GB" sz="2400" b="1" dirty="0">
-                <a:highlight>
-                  <a:srgbClr val="D6D6D6"/>
-                </a:highlight>
                 <a:latin typeface="Helvetica Neue Thin" panose="020B0403020202020204" pitchFamily="34" charset="0"/>
                 <a:ea typeface="Helvetica Neue Thin" panose="020B0403020202020204" pitchFamily="34" charset="0"/>
               </a:rPr>
-              <a:t>frequency of events</a:t>
+              <a:t>distribution or frequency of events</a:t>
             </a:r>
             <a:r>
               <a:rPr lang="en-GB" sz="2400" dirty="0">
-                <a:highlight>
-                  <a:srgbClr val="D6D6D6"/>
-                </a:highlight>
                 <a:latin typeface="Helvetica Neue Thin" panose="020B0403020202020204" pitchFamily="34" charset="0"/>
                 <a:ea typeface="Helvetica Neue Thin" panose="020B0403020202020204" pitchFamily="34" charset="0"/>
               </a:rPr>
@@ -31631,8 +32611,8 @@
         </p:nvSpPr>
         <p:spPr>
           <a:xfrm>
-            <a:off x="1084456" y="5693103"/>
-            <a:ext cx="10023088" cy="830997"/>
+            <a:off x="1184663" y="5789095"/>
+            <a:ext cx="9462459" cy="707886"/>
           </a:xfrm>
           <a:prstGeom prst="rect">
             <a:avLst/>
@@ -31650,7 +32630,7 @@
           <a:lstStyle/>
           <a:p>
             <a:r>
-              <a:rPr lang="en-GB" sz="2400" b="1" dirty="0">
+              <a:rPr lang="en-GB" sz="2000" b="1" dirty="0">
                 <a:latin typeface="HELVETICA NEUE THIN" panose="020B0403020202020204" pitchFamily="34" charset="0"/>
                 <a:ea typeface="HELVETICA NEUE THIN" panose="020B0403020202020204" pitchFamily="34" charset="0"/>
               </a:rPr>
@@ -31683,14 +32663,14 @@
           </a:prstGeom>
           <a:extLst>
             <a:ext uri="{909E8E84-426E-40dd-AFC4-6F175D3DCCD1}">
-              <a14:hiddenFill xmlns:a14="http://schemas.microsoft.com/office/drawing/2010/main" xmlns="">
+              <a14:hiddenFill xmlns="" xmlns:a14="http://schemas.microsoft.com/office/drawing/2010/main">
                 <a:solidFill>
                   <a:srgbClr val="FFFFFF"/>
                 </a:solidFill>
               </a14:hiddenFill>
             </a:ext>
             <a:ext uri="{91240B29-F687-4f45-9708-019B960494DF}">
-              <a14:hiddenLine xmlns:a14="http://schemas.microsoft.com/office/drawing/2010/main" xmlns="" w="9525">
+              <a14:hiddenLine xmlns="" xmlns:a14="http://schemas.microsoft.com/office/drawing/2010/main" w="9525">
                 <a:solidFill>
                   <a:srgbClr val="000000"/>
                 </a:solidFill>
@@ -31891,8 +32871,8 @@
         </p:nvSpPr>
         <p:spPr>
           <a:xfrm>
-            <a:off x="838200" y="133521"/>
-            <a:ext cx="10515600" cy="1325563"/>
+            <a:off x="818789" y="110873"/>
+            <a:ext cx="10515600" cy="1085812"/>
           </a:xfrm>
         </p:spPr>
         <p:txBody>
@@ -31901,13 +32881,13 @@
           <a:p>
             <a:pPr algn="ctr"/>
             <a:r>
-              <a:rPr lang="en-GB" b="1" dirty="0">
+              <a:rPr lang="en-GB" sz="3600" b="1" dirty="0">
                 <a:latin typeface="Helvetica Neue Thin" panose="020B0403020202020204" pitchFamily="34" charset="0"/>
                 <a:ea typeface="Helvetica Neue Thin" panose="020B0403020202020204" pitchFamily="34" charset="0"/>
               </a:rPr>
               <a:t>General techniques for data visualisation [1]</a:t>
             </a:r>
-            <a:endParaRPr lang="en-GB" b="1" dirty="0">
+            <a:endParaRPr lang="en-GB" sz="3600" b="1" dirty="0">
               <a:latin typeface="HELVETICA NEUE THIN" panose="020B0403020202020204" pitchFamily="34" charset="0"/>
               <a:ea typeface="HELVETICA NEUE THIN" panose="020B0403020202020204" pitchFamily="34" charset="0"/>
             </a:endParaRPr>
@@ -32124,14 +33104,14 @@
           </a:prstGeom>
           <a:extLst>
             <a:ext uri="{909E8E84-426E-40dd-AFC4-6F175D3DCCD1}">
-              <a14:hiddenFill xmlns:a14="http://schemas.microsoft.com/office/drawing/2010/main" xmlns="">
+              <a14:hiddenFill xmlns="" xmlns:a14="http://schemas.microsoft.com/office/drawing/2010/main">
                 <a:solidFill>
                   <a:srgbClr val="FFFFFF"/>
                 </a:solidFill>
               </a14:hiddenFill>
             </a:ext>
             <a:ext uri="{91240B29-F687-4f45-9708-019B960494DF}">
-              <a14:hiddenLine xmlns:a14="http://schemas.microsoft.com/office/drawing/2010/main" xmlns="" w="9525">
+              <a14:hiddenLine xmlns="" xmlns:a14="http://schemas.microsoft.com/office/drawing/2010/main" w="9525">
                 <a:solidFill>
                   <a:srgbClr val="000000"/>
                 </a:solidFill>

</xml_diff>